<commit_message>
Added hcl to tutorial-color
</commit_message>
<xml_diff>
--- a/data-viz-02/component/recommendations-colors.pptx
+++ b/data-viz-02/component/recommendations-colors.pptx
@@ -5,7 +5,7 @@
     <p:sldMasterId id="2147483648" r:id="rId1"/>
   </p:sldMasterIdLst>
   <p:notesMasterIdLst>
-    <p:NotesMasterId r:id="rId9"/>
+    <p:NotesMasterId r:id="rId10"/>
   </p:notesMasterIdLst>
   <p:sldIdLst>
     <p:sldId id="256" r:id="rId2"/>
@@ -15,6 +15,7 @@
     <p:sldId id="260" r:id="rId6"/>
     <p:sldId id="261" r:id="rId7"/>
     <p:sldId id="262" r:id="rId8"/>
+    <p:sldId id="263" r:id="rId9"/>
   </p:sldIdLst>
   <p:sldSz cx="9144000" cy="6858000" type="screen4x3"/>
   <p:notesSz cx="6858000" cy="9144000"/>
@@ -911,7 +912,7 @@
           <a:p>
             <a:fld id="{18BDFEC3-8487-43E8-A154-7C12CBC1FFF2}" type="slidenum">
               <a:rPr lang="en-US"/>
-              <a:t>2</a:t>
+              <a:t>3</a:t>
             </a:fld>
             <a:endParaRPr lang="en-US"/>
           </a:p>
@@ -1605,7 +1606,7 @@
           <a:p>
             <a:fld id="{18BDFEC3-8487-43E8-A154-7C12CBC1FFF2}" type="slidenum">
               <a:rPr lang="en-US"/>
-              <a:t>3</a:t>
+              <a:t>4</a:t>
             </a:fld>
             <a:endParaRPr lang="en-US"/>
           </a:p>
@@ -4757,6 +4758,69 @@
             </a:pPr>
             <a:r>
               <a:rPr/>
+              <a:t>Python</a:t>
+            </a:r>
+            <a:r>
+              <a:rPr/>
+              <a:t> </a:t>
+            </a:r>
+            <a:r>
+              <a:rPr/>
+              <a:t>change</a:t>
+            </a:r>
+            <a:r>
+              <a:rPr/>
+              <a:t> </a:t>
+            </a:r>
+            <a:r>
+              <a:rPr/>
+              <a:t>colors</a:t>
+            </a:r>
+          </a:p>
+        </p:txBody>
+      </p:sp>
+    </p:spTree>
+  </p:cSld>
+</p:sld>
+</file>
+
+<file path=ppt/slides/slide3.xml><?xml version="1.0" encoding="utf-8"?>
+<p:sld xmlns:a="http://schemas.openxmlformats.org/drawingml/2006/main" xmlns:r="http://schemas.openxmlformats.org/officeDocument/2006/relationships" xmlns:p="http://schemas.openxmlformats.org/presentationml/2006/main">
+  <p:cSld>
+    <p:spTree>
+      <p:nvGrpSpPr>
+        <p:cNvPr id="1" name=""/>
+        <p:cNvGrpSpPr/>
+        <p:nvPr/>
+      </p:nvGrpSpPr>
+      <p:grpSpPr>
+        <a:xfrm>
+          <a:off x="0" y="0"/>
+          <a:ext cx="0" cy="0"/>
+          <a:chOff x="0" y="0"/>
+          <a:chExt cx="0" cy="0"/>
+        </a:xfrm>
+      </p:grpSpPr>
+      <p:sp>
+        <p:nvSpPr>
+          <p:cNvPr id="2" name="Title 1"/>
+          <p:cNvSpPr>
+            <a:spLocks noGrp="1"/>
+          </p:cNvSpPr>
+          <p:nvPr>
+            <p:ph type="title"/>
+          </p:nvPr>
+        </p:nvSpPr>
+        <p:spPr/>
+        <p:txBody>
+          <a:bodyPr/>
+          <a:lstStyle/>
+          <a:p>
+            <a:pPr lvl="0" marL="0" indent="0">
+              <a:buNone/>
+            </a:pPr>
+            <a:r>
+              <a:rPr/>
               <a:t>Barchart</a:t>
             </a:r>
             <a:r>
@@ -4907,7 +4971,7 @@
 </p:sld>
 </file>
 
-<file path=ppt/slides/slide3.xml><?xml version="1.0" encoding="utf-8"?>
+<file path=ppt/slides/slide4.xml><?xml version="1.0" encoding="utf-8"?>
 <p:sld xmlns:a="http://schemas.openxmlformats.org/drawingml/2006/main" xmlns:r="http://schemas.openxmlformats.org/officeDocument/2006/relationships" xmlns:p="http://schemas.openxmlformats.org/presentationml/2006/main">
   <p:cSld>
     <p:spTree>
@@ -5086,139 +5150,6 @@
 </p:sld>
 </file>
 
-<file path=ppt/slides/slide4.xml><?xml version="1.0" encoding="utf-8"?>
-<p:sld xmlns:a="http://schemas.openxmlformats.org/drawingml/2006/main" xmlns:r="http://schemas.openxmlformats.org/officeDocument/2006/relationships" xmlns:p="http://schemas.openxmlformats.org/presentationml/2006/main">
-  <p:cSld>
-    <p:spTree>
-      <p:nvGrpSpPr>
-        <p:cNvPr id="1" name=""/>
-        <p:cNvGrpSpPr/>
-        <p:nvPr/>
-      </p:nvGrpSpPr>
-      <p:grpSpPr>
-        <a:xfrm>
-          <a:off x="0" y="0"/>
-          <a:ext cx="0" cy="0"/>
-          <a:chOff x="0" y="0"/>
-          <a:chExt cx="0" cy="0"/>
-        </a:xfrm>
-      </p:grpSpPr>
-      <p:sp>
-        <p:nvSpPr>
-          <p:cNvPr id="2" name="Title 1"/>
-          <p:cNvSpPr>
-            <a:spLocks noGrp="1"/>
-          </p:cNvSpPr>
-          <p:nvPr>
-            <p:ph type="title"/>
-          </p:nvPr>
-        </p:nvSpPr>
-        <p:spPr/>
-        <p:txBody>
-          <a:bodyPr/>
-          <a:lstStyle/>
-          <a:p>
-            <a:pPr lvl="0" marL="0" indent="0">
-              <a:buNone/>
-            </a:pPr>
-            <a:r>
-              <a:rPr/>
-              <a:t>Colors,</a:t>
-            </a:r>
-            <a:r>
-              <a:rPr/>
-              <a:t> </a:t>
-            </a:r>
-            <a:r>
-              <a:rPr/>
-              <a:t>Contrasting</a:t>
-            </a:r>
-            <a:r>
-              <a:rPr/>
-              <a:t> </a:t>
-            </a:r>
-            <a:r>
-              <a:rPr/>
-              <a:t>pure</a:t>
-            </a:r>
-            <a:r>
-              <a:rPr/>
-              <a:t> </a:t>
-            </a:r>
-            <a:r>
-              <a:rPr/>
-              <a:t>colors</a:t>
-            </a:r>
-            <a:r>
-              <a:rPr/>
-              <a:t> </a:t>
-            </a:r>
-            <a:r>
-              <a:rPr/>
-              <a:t>often</a:t>
-            </a:r>
-            <a:r>
-              <a:rPr/>
-              <a:t> </a:t>
-            </a:r>
-            <a:r>
-              <a:rPr/>
-              <a:t>appear</a:t>
-            </a:r>
-            <a:r>
-              <a:rPr/>
-              <a:t> </a:t>
-            </a:r>
-            <a:r>
-              <a:rPr/>
-              <a:t>too</a:t>
-            </a:r>
-            <a:r>
-              <a:rPr/>
-              <a:t> </a:t>
-            </a:r>
-            <a:r>
-              <a:rPr/>
-              <a:t>intense</a:t>
-            </a:r>
-          </a:p>
-        </p:txBody>
-      </p:sp>
-      <p:pic>
-        <p:nvPicPr>
-          <p:cNvPr descr="../images/r/intense.png" id="0" name="Picture 1"/>
-          <p:cNvPicPr>
-            <a:picLocks noGrp="1" noChangeAspect="1"/>
-          </p:cNvPicPr>
-          <p:nvPr/>
-        </p:nvPicPr>
-        <p:blipFill>
-          <a:blip r:embed="rId2"/>
-          <a:stretch>
-            <a:fillRect/>
-          </a:stretch>
-        </p:blipFill>
-        <p:spPr bwMode="auto">
-          <a:xfrm>
-            <a:off x="2311400" y="1600200"/>
-            <a:ext cx="4521200" cy="4521200"/>
-          </a:xfrm>
-          <a:prstGeom prst="rect">
-            <a:avLst/>
-          </a:prstGeom>
-          <a:noFill/>
-          <a:ln w="9525">
-            <a:noFill/>
-            <a:headEnd/>
-            <a:tailEnd/>
-          </a:ln>
-        </p:spPr>
-      </p:pic>
-    </p:spTree>
-  </p:cSld>
-</p:sld>
-</file>
-
 <file path=ppt/slides/slide5.xml><?xml version="1.0" encoding="utf-8"?>
 <p:sld xmlns:a="http://schemas.openxmlformats.org/drawingml/2006/main" xmlns:r="http://schemas.openxmlformats.org/officeDocument/2006/relationships" xmlns:p="http://schemas.openxmlformats.org/presentationml/2006/main">
   <p:cSld>
@@ -5264,38 +5195,62 @@
             </a:r>
             <a:r>
               <a:rPr/>
-              <a:t>Lighter</a:t>
-            </a:r>
-            <a:r>
-              <a:rPr/>
-              <a:t> </a:t>
-            </a:r>
-            <a:r>
-              <a:rPr/>
-              <a:t>background,</a:t>
-            </a:r>
-            <a:r>
-              <a:rPr/>
-              <a:t> </a:t>
-            </a:r>
-            <a:r>
-              <a:rPr/>
-              <a:t>darker</a:t>
-            </a:r>
-            <a:r>
-              <a:rPr/>
-              <a:t> </a:t>
-            </a:r>
-            <a:r>
-              <a:rPr/>
-              <a:t>foreground</a:t>
+              <a:t>Contrasting</a:t>
+            </a:r>
+            <a:r>
+              <a:rPr/>
+              <a:t> </a:t>
+            </a:r>
+            <a:r>
+              <a:rPr/>
+              <a:t>pure</a:t>
+            </a:r>
+            <a:r>
+              <a:rPr/>
+              <a:t> </a:t>
+            </a:r>
+            <a:r>
+              <a:rPr/>
+              <a:t>colors</a:t>
+            </a:r>
+            <a:r>
+              <a:rPr/>
+              <a:t> </a:t>
+            </a:r>
+            <a:r>
+              <a:rPr/>
+              <a:t>often</a:t>
+            </a:r>
+            <a:r>
+              <a:rPr/>
+              <a:t> </a:t>
+            </a:r>
+            <a:r>
+              <a:rPr/>
+              <a:t>appear</a:t>
+            </a:r>
+            <a:r>
+              <a:rPr/>
+              <a:t> </a:t>
+            </a:r>
+            <a:r>
+              <a:rPr/>
+              <a:t>too</a:t>
+            </a:r>
+            <a:r>
+              <a:rPr/>
+              <a:t> </a:t>
+            </a:r>
+            <a:r>
+              <a:rPr/>
+              <a:t>intense</a:t>
             </a:r>
           </a:p>
         </p:txBody>
       </p:sp>
       <p:pic>
         <p:nvPicPr>
-          <p:cNvPr descr="../images/r/both.png" id="0" name="Picture 1"/>
+          <p:cNvPr descr="../images/r/intense.png" id="0" name="Picture 1"/>
           <p:cNvPicPr>
             <a:picLocks noGrp="1" noChangeAspect="1"/>
           </p:cNvPicPr>
@@ -5373,6 +5328,115 @@
             </a:r>
             <a:r>
               <a:rPr/>
+              <a:t>Lighter</a:t>
+            </a:r>
+            <a:r>
+              <a:rPr/>
+              <a:t> </a:t>
+            </a:r>
+            <a:r>
+              <a:rPr/>
+              <a:t>background,</a:t>
+            </a:r>
+            <a:r>
+              <a:rPr/>
+              <a:t> </a:t>
+            </a:r>
+            <a:r>
+              <a:rPr/>
+              <a:t>darker</a:t>
+            </a:r>
+            <a:r>
+              <a:rPr/>
+              <a:t> </a:t>
+            </a:r>
+            <a:r>
+              <a:rPr/>
+              <a:t>foreground</a:t>
+            </a:r>
+          </a:p>
+        </p:txBody>
+      </p:sp>
+      <p:pic>
+        <p:nvPicPr>
+          <p:cNvPr descr="../images/r/both.png" id="0" name="Picture 1"/>
+          <p:cNvPicPr>
+            <a:picLocks noGrp="1" noChangeAspect="1"/>
+          </p:cNvPicPr>
+          <p:nvPr/>
+        </p:nvPicPr>
+        <p:blipFill>
+          <a:blip r:embed="rId2"/>
+          <a:stretch>
+            <a:fillRect/>
+          </a:stretch>
+        </p:blipFill>
+        <p:spPr bwMode="auto">
+          <a:xfrm>
+            <a:off x="2311400" y="1600200"/>
+            <a:ext cx="4521200" cy="4521200"/>
+          </a:xfrm>
+          <a:prstGeom prst="rect">
+            <a:avLst/>
+          </a:prstGeom>
+          <a:noFill/>
+          <a:ln w="9525">
+            <a:noFill/>
+            <a:headEnd/>
+            <a:tailEnd/>
+          </a:ln>
+        </p:spPr>
+      </p:pic>
+    </p:spTree>
+  </p:cSld>
+</p:sld>
+</file>
+
+<file path=ppt/slides/slide7.xml><?xml version="1.0" encoding="utf-8"?>
+<p:sld xmlns:a="http://schemas.openxmlformats.org/drawingml/2006/main" xmlns:r="http://schemas.openxmlformats.org/officeDocument/2006/relationships" xmlns:p="http://schemas.openxmlformats.org/presentationml/2006/main">
+  <p:cSld>
+    <p:spTree>
+      <p:nvGrpSpPr>
+        <p:cNvPr id="1" name=""/>
+        <p:cNvGrpSpPr/>
+        <p:nvPr/>
+      </p:nvGrpSpPr>
+      <p:grpSpPr>
+        <a:xfrm>
+          <a:off x="0" y="0"/>
+          <a:ext cx="0" cy="0"/>
+          <a:chOff x="0" y="0"/>
+          <a:chExt cx="0" cy="0"/>
+        </a:xfrm>
+      </p:grpSpPr>
+      <p:sp>
+        <p:nvSpPr>
+          <p:cNvPr id="2" name="Title 1"/>
+          <p:cNvSpPr>
+            <a:spLocks noGrp="1"/>
+          </p:cNvSpPr>
+          <p:nvPr>
+            <p:ph type="title"/>
+          </p:nvPr>
+        </p:nvSpPr>
+        <p:spPr/>
+        <p:txBody>
+          <a:bodyPr/>
+          <a:lstStyle/>
+          <a:p>
+            <a:pPr lvl="0" marL="0" indent="0">
+              <a:buNone/>
+            </a:pPr>
+            <a:r>
+              <a:rPr/>
+              <a:t>Colors,</a:t>
+            </a:r>
+            <a:r>
+              <a:rPr/>
+              <a:t> </a:t>
+            </a:r>
+            <a:r>
+              <a:rPr/>
               <a:t>or</a:t>
             </a:r>
             <a:r>
@@ -5429,7 +5493,7 @@
 </p:sld>
 </file>
 
-<file path=ppt/slides/slide7.xml><?xml version="1.0" encoding="utf-8"?>
+<file path=ppt/slides/slide8.xml><?xml version="1.0" encoding="utf-8"?>
 <p:sld xmlns:a="http://schemas.openxmlformats.org/drawingml/2006/main" xmlns:r="http://schemas.openxmlformats.org/officeDocument/2006/relationships" xmlns:p="http://schemas.openxmlformats.org/presentationml/2006/main">
   <p:cSld>
     <p:spTree>

</xml_diff>

<commit_message>
Categorical recommendations for color in data-viz-02
</commit_message>
<xml_diff>
--- a/data-viz-02/component/recommendations-colors.pptx
+++ b/data-viz-02/component/recommendations-colors.pptx
@@ -5,7 +5,7 @@
     <p:sldMasterId id="2147483648" r:id="rId1"/>
   </p:sldMasterIdLst>
   <p:notesMasterIdLst>
-    <p:NotesMasterId r:id="rId25"/>
+    <p:NotesMasterId r:id="rId28"/>
   </p:notesMasterIdLst>
   <p:sldIdLst>
     <p:sldId id="256" r:id="rId2"/>
@@ -31,6 +31,9 @@
     <p:sldId id="276" r:id="rId22"/>
     <p:sldId id="277" r:id="rId23"/>
     <p:sldId id="278" r:id="rId24"/>
+    <p:sldId id="279" r:id="rId25"/>
+    <p:sldId id="280" r:id="rId26"/>
+    <p:sldId id="281" r:id="rId27"/>
   </p:sldIdLst>
   <p:sldSz cx="9144000" cy="6858000" type="screen4x3"/>
   <p:notesSz cx="6858000" cy="9144000"/>
@@ -3111,7 +3114,479 @@
             </a:pPr>
             <a:r>
               <a:rPr/>
-              <a:t>http://www.cookbook-r.com/Graphs/Colors_(ggplot2)/</a:t>
+              <a:t>Most</a:t>
+            </a:r>
+            <a:r>
+              <a:rPr/>
+              <a:t> </a:t>
+            </a:r>
+            <a:r>
+              <a:rPr/>
+              <a:t>visualization</a:t>
+            </a:r>
+            <a:r>
+              <a:rPr/>
+              <a:t> </a:t>
+            </a:r>
+            <a:r>
+              <a:rPr/>
+              <a:t>experts</a:t>
+            </a:r>
+            <a:r>
+              <a:rPr/>
+              <a:t> </a:t>
+            </a:r>
+            <a:r>
+              <a:rPr/>
+              <a:t>recommend</a:t>
+            </a:r>
+            <a:r>
+              <a:rPr/>
+              <a:t> </a:t>
+            </a:r>
+            <a:r>
+              <a:rPr/>
+              <a:t>against</a:t>
+            </a:r>
+            <a:r>
+              <a:rPr/>
+              <a:t> </a:t>
+            </a:r>
+            <a:r>
+              <a:rPr/>
+              <a:t>the</a:t>
+            </a:r>
+            <a:r>
+              <a:rPr/>
+              <a:t> </a:t>
+            </a:r>
+            <a:r>
+              <a:rPr/>
+              <a:t>use</a:t>
+            </a:r>
+            <a:r>
+              <a:rPr/>
+              <a:t> </a:t>
+            </a:r>
+            <a:r>
+              <a:rPr/>
+              <a:t>of</a:t>
+            </a:r>
+            <a:r>
+              <a:rPr/>
+              <a:t> </a:t>
+            </a:r>
+            <a:r>
+              <a:rPr/>
+              <a:t>circular</a:t>
+            </a:r>
+            <a:r>
+              <a:rPr/>
+              <a:t> </a:t>
+            </a:r>
+            <a:r>
+              <a:rPr/>
+              <a:t>gradients.</a:t>
+            </a:r>
+            <a:r>
+              <a:rPr/>
+              <a:t> </a:t>
+            </a:r>
+            <a:r>
+              <a:rPr/>
+              <a:t>This</a:t>
+            </a:r>
+            <a:r>
+              <a:rPr/>
+              <a:t> </a:t>
+            </a:r>
+            <a:r>
+              <a:rPr/>
+              <a:t>gradient</a:t>
+            </a:r>
+            <a:r>
+              <a:rPr/>
+              <a:t> </a:t>
+            </a:r>
+            <a:r>
+              <a:rPr/>
+              <a:t>would</a:t>
+            </a:r>
+            <a:r>
+              <a:rPr/>
+              <a:t> </a:t>
+            </a:r>
+            <a:r>
+              <a:rPr/>
+              <a:t>make</a:t>
+            </a:r>
+            <a:r>
+              <a:rPr/>
+              <a:t> </a:t>
+            </a:r>
+            <a:r>
+              <a:rPr/>
+              <a:t>values</a:t>
+            </a:r>
+            <a:r>
+              <a:rPr/>
+              <a:t> </a:t>
+            </a:r>
+            <a:r>
+              <a:rPr/>
+              <a:t>at</a:t>
+            </a:r>
+            <a:r>
+              <a:rPr/>
+              <a:t> </a:t>
+            </a:r>
+            <a:r>
+              <a:rPr/>
+              <a:t>the</a:t>
+            </a:r>
+            <a:r>
+              <a:rPr/>
+              <a:t> </a:t>
+            </a:r>
+            <a:r>
+              <a:rPr/>
+              <a:t>low</a:t>
+            </a:r>
+            <a:r>
+              <a:rPr/>
+              <a:t> </a:t>
+            </a:r>
+            <a:r>
+              <a:rPr/>
+              <a:t>end</a:t>
+            </a:r>
+            <a:r>
+              <a:rPr/>
+              <a:t> </a:t>
+            </a:r>
+            <a:r>
+              <a:rPr/>
+              <a:t>of</a:t>
+            </a:r>
+            <a:r>
+              <a:rPr/>
+              <a:t> </a:t>
+            </a:r>
+            <a:r>
+              <a:rPr/>
+              <a:t>the</a:t>
+            </a:r>
+            <a:r>
+              <a:rPr/>
+              <a:t> </a:t>
+            </a:r>
+            <a:r>
+              <a:rPr/>
+              <a:t>scale</a:t>
+            </a:r>
+            <a:r>
+              <a:rPr/>
+              <a:t> </a:t>
+            </a:r>
+            <a:r>
+              <a:rPr/>
+              <a:t>look</a:t>
+            </a:r>
+            <a:r>
+              <a:rPr/>
+              <a:t> </a:t>
+            </a:r>
+            <a:r>
+              <a:rPr/>
+              <a:t>close</a:t>
+            </a:r>
+            <a:r>
+              <a:rPr/>
+              <a:t> </a:t>
+            </a:r>
+            <a:r>
+              <a:rPr/>
+              <a:t>in</a:t>
+            </a:r>
+            <a:r>
+              <a:rPr/>
+              <a:t> </a:t>
+            </a:r>
+            <a:r>
+              <a:rPr/>
+              <a:t>color</a:t>
+            </a:r>
+            <a:r>
+              <a:rPr/>
+              <a:t> </a:t>
+            </a:r>
+            <a:r>
+              <a:rPr/>
+              <a:t>to</a:t>
+            </a:r>
+            <a:r>
+              <a:rPr/>
+              <a:t> </a:t>
+            </a:r>
+            <a:r>
+              <a:rPr/>
+              <a:t>values</a:t>
+            </a:r>
+            <a:r>
+              <a:rPr/>
+              <a:t> </a:t>
+            </a:r>
+            <a:r>
+              <a:rPr/>
+              <a:t>on</a:t>
+            </a:r>
+            <a:r>
+              <a:rPr/>
+              <a:t> </a:t>
+            </a:r>
+            <a:r>
+              <a:rPr/>
+              <a:t>the</a:t>
+            </a:r>
+            <a:r>
+              <a:rPr/>
+              <a:t> </a:t>
+            </a:r>
+            <a:r>
+              <a:rPr/>
+              <a:t>high</a:t>
+            </a:r>
+            <a:r>
+              <a:rPr/>
+              <a:t> </a:t>
+            </a:r>
+            <a:r>
+              <a:rPr/>
+              <a:t>end</a:t>
+            </a:r>
+            <a:r>
+              <a:rPr/>
+              <a:t> </a:t>
+            </a:r>
+            <a:r>
+              <a:rPr/>
+              <a:t>of</a:t>
+            </a:r>
+            <a:r>
+              <a:rPr/>
+              <a:t> </a:t>
+            </a:r>
+            <a:r>
+              <a:rPr/>
+              <a:t>the</a:t>
+            </a:r>
+            <a:r>
+              <a:rPr/>
+              <a:t> </a:t>
+            </a:r>
+            <a:r>
+              <a:rPr/>
+              <a:t>scale.</a:t>
+            </a:r>
+            <a:r>
+              <a:rPr/>
+              <a:t> </a:t>
+            </a:r>
+            <a:r>
+              <a:rPr/>
+              <a:t>This</a:t>
+            </a:r>
+            <a:r>
+              <a:rPr/>
+              <a:t> </a:t>
+            </a:r>
+            <a:r>
+              <a:rPr/>
+              <a:t>almost</a:t>
+            </a:r>
+            <a:r>
+              <a:rPr/>
+              <a:t> </a:t>
+            </a:r>
+            <a:r>
+              <a:rPr/>
+              <a:t>never</a:t>
+            </a:r>
+            <a:r>
+              <a:rPr/>
+              <a:t> </a:t>
+            </a:r>
+            <a:r>
+              <a:rPr/>
+              <a:t>happens.</a:t>
+            </a:r>
+            <a:r>
+              <a:rPr/>
+              <a:t> </a:t>
+            </a:r>
+            <a:r>
+              <a:rPr/>
+              <a:t>The</a:t>
+            </a:r>
+            <a:r>
+              <a:rPr/>
+              <a:t> </a:t>
+            </a:r>
+            <a:r>
+              <a:rPr/>
+              <a:t>one</a:t>
+            </a:r>
+            <a:r>
+              <a:rPr/>
+              <a:t> </a:t>
+            </a:r>
+            <a:r>
+              <a:rPr/>
+              <a:t>prominent</a:t>
+            </a:r>
+            <a:r>
+              <a:rPr/>
+              <a:t> </a:t>
+            </a:r>
+            <a:r>
+              <a:rPr/>
+              <a:t>exception</a:t>
+            </a:r>
+            <a:r>
+              <a:rPr/>
+              <a:t> </a:t>
+            </a:r>
+            <a:r>
+              <a:rPr/>
+              <a:t>would</a:t>
+            </a:r>
+            <a:r>
+              <a:rPr/>
+              <a:t> </a:t>
+            </a:r>
+            <a:r>
+              <a:rPr/>
+              <a:t>be</a:t>
+            </a:r>
+            <a:r>
+              <a:rPr/>
+              <a:t> </a:t>
+            </a:r>
+            <a:r>
+              <a:rPr/>
+              <a:t>a</a:t>
+            </a:r>
+            <a:r>
+              <a:rPr/>
+              <a:t> </a:t>
+            </a:r>
+            <a:r>
+              <a:rPr/>
+              <a:t>variable</a:t>
+            </a:r>
+            <a:r>
+              <a:rPr/>
+              <a:t> </a:t>
+            </a:r>
+            <a:r>
+              <a:rPr/>
+              <a:t>like</a:t>
+            </a:r>
+            <a:r>
+              <a:rPr/>
+              <a:t> </a:t>
+            </a:r>
+            <a:r>
+              <a:rPr/>
+              <a:t>wind</a:t>
+            </a:r>
+            <a:r>
+              <a:rPr/>
+              <a:t> </a:t>
+            </a:r>
+            <a:r>
+              <a:rPr/>
+              <a:t>speed,</a:t>
+            </a:r>
+            <a:r>
+              <a:rPr/>
+              <a:t> </a:t>
+            </a:r>
+            <a:r>
+              <a:rPr/>
+              <a:t>where</a:t>
+            </a:r>
+            <a:r>
+              <a:rPr/>
+              <a:t> </a:t>
+            </a:r>
+            <a:r>
+              <a:rPr/>
+              <a:t>values</a:t>
+            </a:r>
+            <a:r>
+              <a:rPr/>
+              <a:t> </a:t>
+            </a:r>
+            <a:r>
+              <a:rPr/>
+              <a:t>of</a:t>
+            </a:r>
+            <a:r>
+              <a:rPr/>
+              <a:t> </a:t>
+            </a:r>
+            <a:r>
+              <a:rPr/>
+              <a:t>0</a:t>
+            </a:r>
+            <a:r>
+              <a:rPr/>
+              <a:t> </a:t>
+            </a:r>
+            <a:r>
+              <a:rPr/>
+              <a:t>degrees</a:t>
+            </a:r>
+            <a:r>
+              <a:rPr/>
+              <a:t> </a:t>
+            </a:r>
+            <a:r>
+              <a:rPr/>
+              <a:t>and</a:t>
+            </a:r>
+            <a:r>
+              <a:rPr/>
+              <a:t> </a:t>
+            </a:r>
+            <a:r>
+              <a:rPr/>
+              <a:t>360</a:t>
+            </a:r>
+            <a:r>
+              <a:rPr/>
+              <a:t> </a:t>
+            </a:r>
+            <a:r>
+              <a:rPr/>
+              <a:t>degrees</a:t>
+            </a:r>
+            <a:r>
+              <a:rPr/>
+              <a:t> </a:t>
+            </a:r>
+            <a:r>
+              <a:rPr/>
+              <a:t>are</a:t>
+            </a:r>
+            <a:r>
+              <a:rPr/>
+              <a:t> </a:t>
+            </a:r>
+            <a:r>
+              <a:rPr/>
+              <a:t>identical.</a:t>
             </a:r>
           </a:p>
         </p:txBody>
@@ -3133,7 +3608,89 @@
           <a:p>
             <a:fld id="{18BDFEC3-8487-43E8-A154-7C12CBC1FFF2}" type="slidenum">
               <a:rPr lang="en-US"/>
-              <a:t>22</a:t>
+              <a:t>18</a:t>
+            </a:fld>
+            <a:endParaRPr lang="en-US"/>
+          </a:p>
+        </p:txBody>
+      </p:sp>
+    </p:spTree>
+  </p:cSld>
+</p:notes>
+</file>
+
+<file path=ppt/notesSlides/notesSlide17.xml><?xml version="1.0" encoding="utf-8"?>
+<p:notes xmlns:a="http://schemas.openxmlformats.org/drawingml/2006/main" xmlns:r="http://schemas.openxmlformats.org/officeDocument/2006/relationships" xmlns:p="http://schemas.openxmlformats.org/presentationml/2006/main">
+  <p:cSld>
+    <p:spTree>
+      <p:nvGrpSpPr>
+        <p:cNvPr id="1" name=""/>
+        <p:cNvGrpSpPr/>
+        <p:nvPr/>
+      </p:nvGrpSpPr>
+      <p:grpSpPr>
+        <a:xfrm>
+          <a:off x="0" y="0"/>
+          <a:ext cx="0" cy="0"/>
+          <a:chOff x="0" y="0"/>
+          <a:chExt cx="0" cy="0"/>
+        </a:xfrm>
+      </p:grpSpPr>
+      <p:sp>
+        <p:nvSpPr>
+          <p:cNvPr id="2" name="Slide Image Placeholder 1"/>
+          <p:cNvSpPr>
+            <a:spLocks noGrp="1" noRot="1" noChangeAspect="1"/>
+          </p:cNvSpPr>
+          <p:nvPr>
+            <p:ph type="sldImg"/>
+          </p:nvPr>
+        </p:nvSpPr>
+        <p:spPr/>
+      </p:sp>
+      <p:sp>
+        <p:nvSpPr>
+          <p:cNvPr id="3" name="Notes Placeholder 2"/>
+          <p:cNvSpPr>
+            <a:spLocks noGrp="1"/>
+          </p:cNvSpPr>
+          <p:nvPr>
+            <p:ph type="body" idx="1"/>
+          </p:nvPr>
+        </p:nvSpPr>
+        <p:spPr/>
+        <p:txBody>
+          <a:bodyPr/>
+          <a:lstStyle/>
+          <a:p>
+            <a:pPr lvl="0" marL="0" indent="0">
+              <a:buNone/>
+            </a:pPr>
+            <a:r>
+              <a:rPr/>
+              <a:t>http://www.cookbook-r.com/Graphs/Colors_(ggplot2)/</a:t>
+            </a:r>
+          </a:p>
+        </p:txBody>
+      </p:sp>
+      <p:sp>
+        <p:nvSpPr>
+          <p:cNvPr id="4" name="Slide Number Placeholder 3"/>
+          <p:cNvSpPr>
+            <a:spLocks noGrp="1"/>
+          </p:cNvSpPr>
+          <p:nvPr>
+            <p:ph type="sldNum" sz="quarter" idx="10"/>
+          </p:nvPr>
+        </p:nvSpPr>
+        <p:spPr/>
+        <p:txBody>
+          <a:bodyPr/>
+          <a:lstStyle/>
+          <a:p>
+            <a:fld id="{18BDFEC3-8487-43E8-A154-7C12CBC1FFF2}" type="slidenum">
+              <a:rPr lang="en-US"/>
+              <a:t>25</a:t>
             </a:fld>
             <a:endParaRPr lang="en-US"/>
           </a:p>
@@ -14759,6 +15316,14 @@
             </a:pPr>
             <a:r>
               <a:rPr/>
+              <a:t>Recommendations,</a:t>
+            </a:r>
+            <a:r>
+              <a:rPr/>
+              <a:t> </a:t>
+            </a:r>
+            <a:r>
+              <a:rPr/>
               <a:t>When</a:t>
             </a:r>
             <a:r>
@@ -14811,12 +15376,24 @@
           <a:bodyPr/>
           <a:lstStyle/>
           <a:p>
-            <a:pPr lvl="0" marL="0" indent="0">
-              <a:buNone/>
-            </a:pPr>
-            <a:r>
-              <a:rPr/>
-              <a:t>(To be added)</a:t>
+            <a:pPr lvl="1"/>
+            <a:r>
+              <a:rPr/>
+              <a:t>Mostly avoided</a:t>
+            </a:r>
+          </a:p>
+          <a:p>
+            <a:pPr lvl="1"/>
+            <a:r>
+              <a:rPr/>
+              <a:t>Used when two extremes are similar</a:t>
+            </a:r>
+          </a:p>
+          <a:p>
+            <a:pPr lvl="2"/>
+            <a:r>
+              <a:rPr/>
+              <a:t>Wind direction (0 = 360)</a:t>
             </a:r>
           </a:p>
         </p:txBody>
@@ -14863,7 +15440,15 @@
             </a:pPr>
             <a:r>
               <a:rPr/>
-              <a:t>Equal</a:t>
+              <a:t>Recommendations,</a:t>
+            </a:r>
+            <a:r>
+              <a:rPr/>
+              <a:t> </a:t>
+            </a:r>
+            <a:r>
+              <a:rPr/>
+              <a:t>Unequal</a:t>
             </a:r>
             <a:r>
               <a:rPr/>
@@ -14872,35 +15457,64 @@
             <a:r>
               <a:rPr/>
               <a:t>luminence</a:t>
+            </a:r>
+            <a:r>
+              <a:rPr/>
+              <a:t> </a:t>
+            </a:r>
+            <a:r>
+              <a:rPr/>
+              <a:t>causes</a:t>
+            </a:r>
+            <a:r>
+              <a:rPr/>
+              <a:t> </a:t>
+            </a:r>
+            <a:r>
+              <a:rPr/>
+              <a:t>optical</a:t>
+            </a:r>
+            <a:r>
+              <a:rPr/>
+              <a:t> </a:t>
+            </a:r>
+            <a:r>
+              <a:rPr/>
+              <a:t>illusions</a:t>
             </a:r>
           </a:p>
         </p:txBody>
       </p:sp>
-      <p:sp>
-        <p:nvSpPr>
-          <p:cNvPr id="3" name="Content Placeholder 2"/>
-          <p:cNvSpPr>
-            <a:spLocks noGrp="1"/>
-          </p:cNvSpPr>
-          <p:nvPr>
-            <p:ph idx="1"/>
-          </p:nvPr>
-        </p:nvSpPr>
-        <p:spPr/>
-        <p:txBody>
-          <a:bodyPr/>
-          <a:lstStyle/>
-          <a:p>
-            <a:pPr lvl="0" marL="0" indent="0">
-              <a:buNone/>
-            </a:pPr>
-            <a:r>
-              <a:rPr/>
-              <a:t>(To be added)</a:t>
-            </a:r>
-          </a:p>
-        </p:txBody>
-      </p:sp>
+      <p:pic>
+        <p:nvPicPr>
+          <p:cNvPr descr="../images/r/optical-illusion.png" id="0" name="Picture 1"/>
+          <p:cNvPicPr>
+            <a:picLocks noGrp="1" noChangeAspect="1"/>
+          </p:cNvPicPr>
+          <p:nvPr/>
+        </p:nvPicPr>
+        <p:blipFill>
+          <a:blip r:embed="rId2"/>
+          <a:stretch>
+            <a:fillRect/>
+          </a:stretch>
+        </p:blipFill>
+        <p:spPr bwMode="auto">
+          <a:xfrm>
+            <a:off x="2311400" y="1600200"/>
+            <a:ext cx="4521200" cy="4521200"/>
+          </a:xfrm>
+          <a:prstGeom prst="rect">
+            <a:avLst/>
+          </a:prstGeom>
+          <a:noFill/>
+          <a:ln w="9525">
+            <a:noFill/>
+            <a:headEnd/>
+            <a:tailEnd/>
+          </a:ln>
+        </p:spPr>
+      </p:pic>
     </p:spTree>
   </p:cSld>
 </p:sld>
@@ -15146,44 +15760,81 @@
             </a:pPr>
             <a:r>
               <a:rPr/>
-              <a:t>Avoid</a:t>
-            </a:r>
-            <a:r>
-              <a:rPr/>
-              <a:t> </a:t>
-            </a:r>
-            <a:r>
-              <a:rPr/>
-              <a:t>crosshatching</a:t>
+              <a:t>Recommendations,</a:t>
+            </a:r>
+            <a:r>
+              <a:rPr/>
+              <a:t> </a:t>
+            </a:r>
+            <a:r>
+              <a:rPr/>
+              <a:t>Minimze</a:t>
+            </a:r>
+            <a:r>
+              <a:rPr/>
+              <a:t> </a:t>
+            </a:r>
+            <a:r>
+              <a:rPr/>
+              <a:t>illusions</a:t>
+            </a:r>
+            <a:r>
+              <a:rPr/>
+              <a:t> </a:t>
+            </a:r>
+            <a:r>
+              <a:rPr/>
+              <a:t>with</a:t>
+            </a:r>
+            <a:r>
+              <a:rPr/>
+              <a:t> </a:t>
+            </a:r>
+            <a:r>
+              <a:rPr/>
+              <a:t>equalized</a:t>
+            </a:r>
+            <a:r>
+              <a:rPr/>
+              <a:t> </a:t>
+            </a:r>
+            <a:r>
+              <a:rPr/>
+              <a:t>luminance</a:t>
             </a:r>
           </a:p>
         </p:txBody>
       </p:sp>
-      <p:sp>
-        <p:nvSpPr>
-          <p:cNvPr id="3" name="Content Placeholder 2"/>
-          <p:cNvSpPr>
-            <a:spLocks noGrp="1"/>
-          </p:cNvSpPr>
-          <p:nvPr>
-            <p:ph idx="1"/>
-          </p:nvPr>
-        </p:nvSpPr>
-        <p:spPr/>
-        <p:txBody>
-          <a:bodyPr/>
-          <a:lstStyle/>
-          <a:p>
-            <a:pPr lvl="0" marL="0" indent="0">
-              <a:buNone/>
-            </a:pPr>
-            <a:r>
-              <a:rPr/>
-              <a:t>(To be added)</a:t>
-            </a:r>
-          </a:p>
-        </p:txBody>
-      </p:sp>
+      <p:pic>
+        <p:nvPicPr>
+          <p:cNvPr descr="../images/r/equalize-luminance.png" id="0" name="Picture 1"/>
+          <p:cNvPicPr>
+            <a:picLocks noGrp="1" noChangeAspect="1"/>
+          </p:cNvPicPr>
+          <p:nvPr/>
+        </p:nvPicPr>
+        <p:blipFill>
+          <a:blip r:embed="rId2"/>
+          <a:stretch>
+            <a:fillRect/>
+          </a:stretch>
+        </p:blipFill>
+        <p:spPr bwMode="auto">
+          <a:xfrm>
+            <a:off x="2311400" y="1600200"/>
+            <a:ext cx="4521200" cy="4521200"/>
+          </a:xfrm>
+          <a:prstGeom prst="rect">
+            <a:avLst/>
+          </a:prstGeom>
+          <a:noFill/>
+          <a:ln w="9525">
+            <a:noFill/>
+            <a:headEnd/>
+            <a:tailEnd/>
+          </a:ln>
+        </p:spPr>
+      </p:pic>
     </p:spTree>
   </p:cSld>
 </p:sld>
@@ -15226,7 +15877,39 @@
             </a:pPr>
             <a:r>
               <a:rPr/>
-              <a:t>Varying</a:t>
+              <a:t>Recommendations,</a:t>
+            </a:r>
+            <a:r>
+              <a:rPr/>
+              <a:t> </a:t>
+            </a:r>
+            <a:r>
+              <a:rPr/>
+              <a:t>same</a:t>
+            </a:r>
+            <a:r>
+              <a:rPr/>
+              <a:t> </a:t>
+            </a:r>
+            <a:r>
+              <a:rPr/>
+              <a:t>luminance,</a:t>
+            </a:r>
+            <a:r>
+              <a:rPr/>
+              <a:t> </a:t>
+            </a:r>
+            <a:r>
+              <a:rPr/>
+              <a:t>equally</a:t>
+            </a:r>
+            <a:r>
+              <a:rPr/>
+              <a:t> </a:t>
+            </a:r>
+            <a:r>
+              <a:rPr/>
+              <a:t>spaced</a:t>
             </a:r>
             <a:r>
               <a:rPr/>
@@ -15236,21 +15919,199 @@
               <a:rPr/>
               <a:t>hue</a:t>
             </a:r>
-            <a:r>
-              <a:rPr/>
-              <a:t> </a:t>
-            </a:r>
-            <a:r>
-              <a:rPr/>
-              <a:t>and</a:t>
-            </a:r>
-            <a:r>
-              <a:rPr/>
-              <a:t> </a:t>
-            </a:r>
-            <a:r>
-              <a:rPr/>
-              <a:t>saturation</a:t>
+          </a:p>
+        </p:txBody>
+      </p:sp>
+      <p:pic>
+        <p:nvPicPr>
+          <p:cNvPr descr="../images/r/hcl-circle.png" id="0" name="Picture 1"/>
+          <p:cNvPicPr>
+            <a:picLocks noGrp="1" noChangeAspect="1"/>
+          </p:cNvPicPr>
+          <p:nvPr/>
+        </p:nvPicPr>
+        <p:blipFill>
+          <a:blip r:embed="rId2"/>
+          <a:stretch>
+            <a:fillRect/>
+          </a:stretch>
+        </p:blipFill>
+        <p:spPr bwMode="auto">
+          <a:xfrm>
+            <a:off x="2311400" y="1600200"/>
+            <a:ext cx="4521200" cy="4521200"/>
+          </a:xfrm>
+          <a:prstGeom prst="rect">
+            <a:avLst/>
+          </a:prstGeom>
+          <a:noFill/>
+          <a:ln w="9525">
+            <a:noFill/>
+            <a:headEnd/>
+            <a:tailEnd/>
+          </a:ln>
+        </p:spPr>
+      </p:pic>
+    </p:spTree>
+  </p:cSld>
+</p:sld>
+</file>
+
+<file path=ppt/slides/slide22.xml><?xml version="1.0" encoding="utf-8"?>
+<p:sld xmlns:a="http://schemas.openxmlformats.org/drawingml/2006/main" xmlns:r="http://schemas.openxmlformats.org/officeDocument/2006/relationships" xmlns:p="http://schemas.openxmlformats.org/presentationml/2006/main">
+  <p:cSld>
+    <p:spTree>
+      <p:nvGrpSpPr>
+        <p:cNvPr id="1" name=""/>
+        <p:cNvGrpSpPr/>
+        <p:nvPr/>
+      </p:nvGrpSpPr>
+      <p:grpSpPr>
+        <a:xfrm>
+          <a:off x="0" y="0"/>
+          <a:ext cx="0" cy="0"/>
+          <a:chOff x="0" y="0"/>
+          <a:chExt cx="0" cy="0"/>
+        </a:xfrm>
+      </p:grpSpPr>
+      <p:sp>
+        <p:nvSpPr>
+          <p:cNvPr id="2" name="Title 1"/>
+          <p:cNvSpPr>
+            <a:spLocks noGrp="1"/>
+          </p:cNvSpPr>
+          <p:nvPr>
+            <p:ph type="title"/>
+          </p:nvPr>
+        </p:nvSpPr>
+        <p:spPr/>
+        <p:txBody>
+          <a:bodyPr/>
+          <a:lstStyle/>
+          <a:p>
+            <a:pPr lvl="0" marL="0" indent="0">
+              <a:buNone/>
+            </a:pPr>
+            <a:r>
+              <a:rPr/>
+              <a:t>Recommendations,</a:t>
+            </a:r>
+            <a:r>
+              <a:rPr/>
+              <a:t> </a:t>
+            </a:r>
+            <a:r>
+              <a:rPr/>
+              <a:t>equally</a:t>
+            </a:r>
+            <a:r>
+              <a:rPr/>
+              <a:t> </a:t>
+            </a:r>
+            <a:r>
+              <a:rPr/>
+              <a:t>spaced</a:t>
+            </a:r>
+            <a:r>
+              <a:rPr/>
+              <a:t> </a:t>
+            </a:r>
+            <a:r>
+              <a:rPr/>
+              <a:t>hue,</a:t>
+            </a:r>
+            <a:r>
+              <a:rPr/>
+              <a:t> </a:t>
+            </a:r>
+            <a:r>
+              <a:rPr/>
+              <a:t>luminance</a:t>
+            </a:r>
+          </a:p>
+        </p:txBody>
+      </p:sp>
+      <p:pic>
+        <p:nvPicPr>
+          <p:cNvPr descr="../images/r/darker-hcl-circle.png" id="0" name="Picture 1"/>
+          <p:cNvPicPr>
+            <a:picLocks noGrp="1" noChangeAspect="1"/>
+          </p:cNvPicPr>
+          <p:nvPr/>
+        </p:nvPicPr>
+        <p:blipFill>
+          <a:blip r:embed="rId2"/>
+          <a:stretch>
+            <a:fillRect/>
+          </a:stretch>
+        </p:blipFill>
+        <p:spPr bwMode="auto">
+          <a:xfrm>
+            <a:off x="2311400" y="1600200"/>
+            <a:ext cx="4521200" cy="4521200"/>
+          </a:xfrm>
+          <a:prstGeom prst="rect">
+            <a:avLst/>
+          </a:prstGeom>
+          <a:noFill/>
+          <a:ln w="9525">
+            <a:noFill/>
+            <a:headEnd/>
+            <a:tailEnd/>
+          </a:ln>
+        </p:spPr>
+      </p:pic>
+    </p:spTree>
+  </p:cSld>
+</p:sld>
+</file>
+
+<file path=ppt/slides/slide23.xml><?xml version="1.0" encoding="utf-8"?>
+<p:sld xmlns:a="http://schemas.openxmlformats.org/drawingml/2006/main" xmlns:r="http://schemas.openxmlformats.org/officeDocument/2006/relationships" xmlns:p="http://schemas.openxmlformats.org/presentationml/2006/main">
+  <p:cSld>
+    <p:spTree>
+      <p:nvGrpSpPr>
+        <p:cNvPr id="1" name=""/>
+        <p:cNvGrpSpPr/>
+        <p:nvPr/>
+      </p:nvGrpSpPr>
+      <p:grpSpPr>
+        <a:xfrm>
+          <a:off x="0" y="0"/>
+          <a:ext cx="0" cy="0"/>
+          <a:chOff x="0" y="0"/>
+          <a:chExt cx="0" cy="0"/>
+        </a:xfrm>
+      </p:grpSpPr>
+      <p:sp>
+        <p:nvSpPr>
+          <p:cNvPr id="2" name="Title 1"/>
+          <p:cNvSpPr>
+            <a:spLocks noGrp="1"/>
+          </p:cNvSpPr>
+          <p:nvPr>
+            <p:ph type="title"/>
+          </p:nvPr>
+        </p:nvSpPr>
+        <p:spPr/>
+        <p:txBody>
+          <a:bodyPr/>
+          <a:lstStyle/>
+          <a:p>
+            <a:pPr lvl="0" marL="0" indent="0">
+              <a:buNone/>
+            </a:pPr>
+            <a:r>
+              <a:rPr/>
+              <a:t>Avoid</a:t>
+            </a:r>
+            <a:r>
+              <a:rPr/>
+              <a:t> </a:t>
+            </a:r>
+            <a:r>
+              <a:rPr/>
+              <a:t>crosshatching</a:t>
             </a:r>
           </a:p>
         </p:txBody>
@@ -15285,7 +16146,103 @@
 </p:sld>
 </file>
 
-<file path=ppt/slides/slide22.xml><?xml version="1.0" encoding="utf-8"?>
+<file path=ppt/slides/slide24.xml><?xml version="1.0" encoding="utf-8"?>
+<p:sld xmlns:a="http://schemas.openxmlformats.org/drawingml/2006/main" xmlns:r="http://schemas.openxmlformats.org/officeDocument/2006/relationships" xmlns:p="http://schemas.openxmlformats.org/presentationml/2006/main">
+  <p:cSld>
+    <p:spTree>
+      <p:nvGrpSpPr>
+        <p:cNvPr id="1" name=""/>
+        <p:cNvGrpSpPr/>
+        <p:nvPr/>
+      </p:nvGrpSpPr>
+      <p:grpSpPr>
+        <a:xfrm>
+          <a:off x="0" y="0"/>
+          <a:ext cx="0" cy="0"/>
+          <a:chOff x="0" y="0"/>
+          <a:chExt cx="0" cy="0"/>
+        </a:xfrm>
+      </p:grpSpPr>
+      <p:sp>
+        <p:nvSpPr>
+          <p:cNvPr id="2" name="Title 1"/>
+          <p:cNvSpPr>
+            <a:spLocks noGrp="1"/>
+          </p:cNvSpPr>
+          <p:nvPr>
+            <p:ph type="title"/>
+          </p:nvPr>
+        </p:nvSpPr>
+        <p:spPr/>
+        <p:txBody>
+          <a:bodyPr/>
+          <a:lstStyle/>
+          <a:p>
+            <a:pPr lvl="0" marL="0" indent="0">
+              <a:buNone/>
+            </a:pPr>
+            <a:r>
+              <a:rPr/>
+              <a:t>Varying</a:t>
+            </a:r>
+            <a:r>
+              <a:rPr/>
+              <a:t> </a:t>
+            </a:r>
+            <a:r>
+              <a:rPr/>
+              <a:t>hue</a:t>
+            </a:r>
+            <a:r>
+              <a:rPr/>
+              <a:t> </a:t>
+            </a:r>
+            <a:r>
+              <a:rPr/>
+              <a:t>and</a:t>
+            </a:r>
+            <a:r>
+              <a:rPr/>
+              <a:t> </a:t>
+            </a:r>
+            <a:r>
+              <a:rPr/>
+              <a:t>saturation</a:t>
+            </a:r>
+          </a:p>
+        </p:txBody>
+      </p:sp>
+      <p:sp>
+        <p:nvSpPr>
+          <p:cNvPr id="3" name="Content Placeholder 2"/>
+          <p:cNvSpPr>
+            <a:spLocks noGrp="1"/>
+          </p:cNvSpPr>
+          <p:nvPr>
+            <p:ph idx="1"/>
+          </p:nvPr>
+        </p:nvSpPr>
+        <p:spPr/>
+        <p:txBody>
+          <a:bodyPr/>
+          <a:lstStyle/>
+          <a:p>
+            <a:pPr lvl="0" marL="0" indent="0">
+              <a:buNone/>
+            </a:pPr>
+            <a:r>
+              <a:rPr/>
+              <a:t>(To be added)</a:t>
+            </a:r>
+          </a:p>
+        </p:txBody>
+      </p:sp>
+    </p:spTree>
+  </p:cSld>
+</p:sld>
+</file>
+
+<file path=ppt/slides/slide25.xml><?xml version="1.0" encoding="utf-8"?>
 <p:sld xmlns:a="http://schemas.openxmlformats.org/drawingml/2006/main" xmlns:r="http://schemas.openxmlformats.org/officeDocument/2006/relationships" xmlns:p="http://schemas.openxmlformats.org/presentationml/2006/main">
   <p:cSld>
     <p:spTree>
@@ -15337,7 +16294,7 @@
 </p:sld>
 </file>
 
-<file path=ppt/slides/slide23.xml><?xml version="1.0" encoding="utf-8"?>
+<file path=ppt/slides/slide26.xml><?xml version="1.0" encoding="utf-8"?>
 <p:sld xmlns:a="http://schemas.openxmlformats.org/drawingml/2006/main" xmlns:r="http://schemas.openxmlformats.org/officeDocument/2006/relationships" xmlns:p="http://schemas.openxmlformats.org/presentationml/2006/main">
   <p:cSld>
     <p:spTree>

</xml_diff>

<commit_message>
Finalized color recommendations in data-viz-02
</commit_message>
<xml_diff>
--- a/data-viz-02/component/recommendations-colors.pptx
+++ b/data-viz-02/component/recommendations-colors.pptx
@@ -5,7 +5,7 @@
     <p:sldMasterId id="2147483648" r:id="rId1"/>
   </p:sldMasterIdLst>
   <p:notesMasterIdLst>
-    <p:NotesMasterId r:id="rId28"/>
+    <p:NotesMasterId r:id="rId30"/>
   </p:notesMasterIdLst>
   <p:sldIdLst>
     <p:sldId id="256" r:id="rId2"/>
@@ -34,6 +34,8 @@
     <p:sldId id="279" r:id="rId25"/>
     <p:sldId id="280" r:id="rId26"/>
     <p:sldId id="281" r:id="rId27"/>
+    <p:sldId id="282" r:id="rId28"/>
+    <p:sldId id="283" r:id="rId29"/>
   </p:sldIdLst>
   <p:sldSz cx="9144000" cy="6858000" type="screen4x3"/>
   <p:notesSz cx="6858000" cy="9144000"/>
@@ -3668,7 +3670,1199 @@
             </a:pPr>
             <a:r>
               <a:rPr/>
-              <a:t>http://www.cookbook-r.com/Graphs/Colors_(ggplot2)/</a:t>
+              <a:t>Equal</a:t>
+            </a:r>
+            <a:r>
+              <a:rPr/>
+              <a:t> </a:t>
+            </a:r>
+            <a:r>
+              <a:rPr/>
+              <a:t>luminance</a:t>
+            </a:r>
+            <a:r>
+              <a:rPr/>
+              <a:t> </a:t>
+            </a:r>
+            <a:r>
+              <a:rPr/>
+              <a:t>does</a:t>
+            </a:r>
+            <a:r>
+              <a:rPr/>
+              <a:t> </a:t>
+            </a:r>
+            <a:r>
+              <a:rPr/>
+              <a:t>present</a:t>
+            </a:r>
+            <a:r>
+              <a:rPr/>
+              <a:t> </a:t>
+            </a:r>
+            <a:r>
+              <a:rPr/>
+              <a:t>some</a:t>
+            </a:r>
+            <a:r>
+              <a:rPr/>
+              <a:t> </a:t>
+            </a:r>
+            <a:r>
+              <a:rPr/>
+              <a:t>disadvantages</a:t>
+            </a:r>
+            <a:r>
+              <a:rPr/>
+              <a:t> </a:t>
+            </a:r>
+            <a:r>
+              <a:rPr/>
+              <a:t>that</a:t>
+            </a:r>
+            <a:r>
+              <a:rPr/>
+              <a:t> </a:t>
+            </a:r>
+            <a:r>
+              <a:rPr/>
+              <a:t>you</a:t>
+            </a:r>
+            <a:r>
+              <a:rPr/>
+              <a:t> </a:t>
+            </a:r>
+            <a:r>
+              <a:rPr/>
+              <a:t>need</a:t>
+            </a:r>
+            <a:r>
+              <a:rPr/>
+              <a:t> </a:t>
+            </a:r>
+            <a:r>
+              <a:rPr/>
+              <a:t>to</a:t>
+            </a:r>
+            <a:r>
+              <a:rPr/>
+              <a:t> </a:t>
+            </a:r>
+            <a:r>
+              <a:rPr/>
+              <a:t>be</a:t>
+            </a:r>
+            <a:r>
+              <a:rPr/>
+              <a:t> </a:t>
+            </a:r>
+            <a:r>
+              <a:rPr/>
+              <a:t>aware</a:t>
+            </a:r>
+            <a:r>
+              <a:rPr/>
+              <a:t> </a:t>
+            </a:r>
+            <a:r>
+              <a:rPr/>
+              <a:t>of.</a:t>
+            </a:r>
+            <a:r>
+              <a:rPr/>
+              <a:t> </a:t>
+            </a:r>
+            <a:r>
+              <a:rPr/>
+              <a:t>There</a:t>
+            </a:r>
+            <a:r>
+              <a:rPr/>
+              <a:t> </a:t>
+            </a:r>
+            <a:r>
+              <a:rPr/>
+              <a:t>is</a:t>
+            </a:r>
+            <a:r>
+              <a:rPr/>
+              <a:t> </a:t>
+            </a:r>
+            <a:r>
+              <a:rPr/>
+              <a:t>less</a:t>
+            </a:r>
+            <a:r>
+              <a:rPr/>
+              <a:t> </a:t>
+            </a:r>
+            <a:r>
+              <a:rPr/>
+              <a:t>contrast</a:t>
+            </a:r>
+            <a:r>
+              <a:rPr/>
+              <a:t> </a:t>
+            </a:r>
+            <a:r>
+              <a:rPr/>
+              <a:t>among</a:t>
+            </a:r>
+            <a:r>
+              <a:rPr/>
+              <a:t> </a:t>
+            </a:r>
+            <a:r>
+              <a:rPr/>
+              <a:t>equal</a:t>
+            </a:r>
+            <a:r>
+              <a:rPr/>
+              <a:t> </a:t>
+            </a:r>
+            <a:r>
+              <a:rPr/>
+              <a:t>luminance</a:t>
+            </a:r>
+            <a:r>
+              <a:rPr/>
+              <a:t> </a:t>
+            </a:r>
+            <a:r>
+              <a:rPr/>
+              <a:t>colors</a:t>
+            </a:r>
+            <a:r>
+              <a:rPr/>
+              <a:t> </a:t>
+            </a:r>
+            <a:r>
+              <a:rPr/>
+              <a:t>that</a:t>
+            </a:r>
+            <a:r>
+              <a:rPr/>
+              <a:t> </a:t>
+            </a:r>
+            <a:r>
+              <a:rPr/>
+              <a:t>there</a:t>
+            </a:r>
+            <a:r>
+              <a:rPr/>
+              <a:t> </a:t>
+            </a:r>
+            <a:r>
+              <a:rPr/>
+              <a:t>would</a:t>
+            </a:r>
+            <a:r>
+              <a:rPr/>
+              <a:t> </a:t>
+            </a:r>
+            <a:r>
+              <a:rPr/>
+              <a:t>be</a:t>
+            </a:r>
+            <a:r>
+              <a:rPr/>
+              <a:t> </a:t>
+            </a:r>
+            <a:r>
+              <a:rPr/>
+              <a:t>among</a:t>
+            </a:r>
+            <a:r>
+              <a:rPr/>
+              <a:t> </a:t>
+            </a:r>
+            <a:r>
+              <a:rPr/>
+              <a:t>colors</a:t>
+            </a:r>
+            <a:r>
+              <a:rPr/>
+              <a:t> </a:t>
+            </a:r>
+            <a:r>
+              <a:rPr/>
+              <a:t>that</a:t>
+            </a:r>
+            <a:r>
+              <a:rPr/>
+              <a:t> </a:t>
+            </a:r>
+            <a:r>
+              <a:rPr/>
+              <a:t>have</a:t>
+            </a:r>
+            <a:r>
+              <a:rPr/>
+              <a:t> </a:t>
+            </a:r>
+            <a:r>
+              <a:rPr/>
+              <a:t>variations</a:t>
+            </a:r>
+            <a:r>
+              <a:rPr/>
+              <a:t> </a:t>
+            </a:r>
+            <a:r>
+              <a:rPr/>
+              <a:t>in</a:t>
+            </a:r>
+            <a:r>
+              <a:rPr/>
+              <a:t> </a:t>
+            </a:r>
+            <a:r>
+              <a:rPr/>
+              <a:t>luminance.</a:t>
+            </a:r>
+          </a:p>
+          <a:p>
+            <a:pPr lvl="0" marL="0" indent="0">
+              <a:buNone/>
+            </a:pPr>
+          </a:p>
+          <a:p>
+            <a:pPr lvl="0" marL="0" indent="0">
+              <a:buNone/>
+            </a:pPr>
+            <a:r>
+              <a:rPr/>
+              <a:t>Colors</a:t>
+            </a:r>
+            <a:r>
+              <a:rPr/>
+              <a:t> </a:t>
+            </a:r>
+            <a:r>
+              <a:rPr/>
+              <a:t>with</a:t>
+            </a:r>
+            <a:r>
+              <a:rPr/>
+              <a:t> </a:t>
+            </a:r>
+            <a:r>
+              <a:rPr/>
+              <a:t>equal</a:t>
+            </a:r>
+            <a:r>
+              <a:rPr/>
+              <a:t> </a:t>
+            </a:r>
+            <a:r>
+              <a:rPr/>
+              <a:t>luminance</a:t>
+            </a:r>
+            <a:r>
+              <a:rPr/>
+              <a:t> </a:t>
+            </a:r>
+            <a:r>
+              <a:rPr/>
+              <a:t>tend</a:t>
+            </a:r>
+            <a:r>
+              <a:rPr/>
+              <a:t> </a:t>
+            </a:r>
+            <a:r>
+              <a:rPr/>
+              <a:t>to</a:t>
+            </a:r>
+            <a:r>
+              <a:rPr/>
+              <a:t> </a:t>
+            </a:r>
+            <a:r>
+              <a:rPr/>
+              <a:t>produce</a:t>
+            </a:r>
+            <a:r>
+              <a:rPr/>
+              <a:t> </a:t>
+            </a:r>
+            <a:r>
+              <a:rPr/>
+              <a:t>the</a:t>
+            </a:r>
+            <a:r>
+              <a:rPr/>
+              <a:t> </a:t>
+            </a:r>
+            <a:r>
+              <a:rPr/>
+              <a:t>exact</a:t>
+            </a:r>
+            <a:r>
+              <a:rPr/>
+              <a:t> </a:t>
+            </a:r>
+            <a:r>
+              <a:rPr/>
+              <a:t>same</a:t>
+            </a:r>
+            <a:r>
+              <a:rPr/>
+              <a:t> </a:t>
+            </a:r>
+            <a:r>
+              <a:rPr/>
+              <a:t>gray</a:t>
+            </a:r>
+            <a:r>
+              <a:rPr/>
+              <a:t> </a:t>
+            </a:r>
+            <a:r>
+              <a:rPr/>
+              <a:t>shade</a:t>
+            </a:r>
+            <a:r>
+              <a:rPr/>
+              <a:t> </a:t>
+            </a:r>
+            <a:r>
+              <a:rPr/>
+              <a:t>in</a:t>
+            </a:r>
+            <a:r>
+              <a:rPr/>
+              <a:t> </a:t>
+            </a:r>
+            <a:r>
+              <a:rPr/>
+              <a:t>black</a:t>
+            </a:r>
+            <a:r>
+              <a:rPr/>
+              <a:t> </a:t>
+            </a:r>
+            <a:r>
+              <a:rPr/>
+              <a:t>and</a:t>
+            </a:r>
+            <a:r>
+              <a:rPr/>
+              <a:t> </a:t>
+            </a:r>
+            <a:r>
+              <a:rPr/>
+              <a:t>white</a:t>
+            </a:r>
+            <a:r>
+              <a:rPr/>
+              <a:t> </a:t>
+            </a:r>
+            <a:r>
+              <a:rPr/>
+              <a:t>reproductions</a:t>
+            </a:r>
+            <a:r>
+              <a:rPr/>
+              <a:t> </a:t>
+            </a:r>
+            <a:r>
+              <a:rPr/>
+              <a:t>of</a:t>
+            </a:r>
+            <a:r>
+              <a:rPr/>
+              <a:t> </a:t>
+            </a:r>
+            <a:r>
+              <a:rPr/>
+              <a:t>color</a:t>
+            </a:r>
+            <a:r>
+              <a:rPr/>
+              <a:t> </a:t>
+            </a:r>
+            <a:r>
+              <a:rPr/>
+              <a:t>graphs.</a:t>
+            </a:r>
+          </a:p>
+          <a:p>
+            <a:pPr lvl="0" marL="0" indent="0">
+              <a:buNone/>
+            </a:pPr>
+          </a:p>
+          <a:p>
+            <a:pPr lvl="0" marL="0" indent="0">
+              <a:buNone/>
+            </a:pPr>
+            <a:r>
+              <a:rPr/>
+              <a:t>Equal</a:t>
+            </a:r>
+            <a:r>
+              <a:rPr/>
+              <a:t> </a:t>
+            </a:r>
+            <a:r>
+              <a:rPr/>
+              <a:t>luminance</a:t>
+            </a:r>
+            <a:r>
+              <a:rPr/>
+              <a:t> </a:t>
+            </a:r>
+            <a:r>
+              <a:rPr/>
+              <a:t>can,</a:t>
+            </a:r>
+            <a:r>
+              <a:rPr/>
+              <a:t> </a:t>
+            </a:r>
+            <a:r>
+              <a:rPr/>
+              <a:t>in</a:t>
+            </a:r>
+            <a:r>
+              <a:rPr/>
+              <a:t> </a:t>
+            </a:r>
+            <a:r>
+              <a:rPr/>
+              <a:t>some</a:t>
+            </a:r>
+            <a:r>
+              <a:rPr/>
+              <a:t> </a:t>
+            </a:r>
+            <a:r>
+              <a:rPr/>
+              <a:t>situations,</a:t>
+            </a:r>
+            <a:r>
+              <a:rPr/>
+              <a:t> </a:t>
+            </a:r>
+            <a:r>
+              <a:rPr/>
+              <a:t>produce</a:t>
+            </a:r>
+            <a:r>
+              <a:rPr/>
+              <a:t> </a:t>
+            </a:r>
+            <a:r>
+              <a:rPr/>
+              <a:t>more</a:t>
+            </a:r>
+            <a:r>
+              <a:rPr/>
+              <a:t> </a:t>
+            </a:r>
+            <a:r>
+              <a:rPr/>
+              <a:t>problems</a:t>
+            </a:r>
+            <a:r>
+              <a:rPr/>
+              <a:t> </a:t>
+            </a:r>
+            <a:r>
+              <a:rPr/>
+              <a:t>for</a:t>
+            </a:r>
+            <a:r>
+              <a:rPr/>
+              <a:t> </a:t>
+            </a:r>
+            <a:r>
+              <a:rPr/>
+              <a:t>color</a:t>
+            </a:r>
+            <a:r>
+              <a:rPr/>
+              <a:t> </a:t>
+            </a:r>
+            <a:r>
+              <a:rPr/>
+              <a:t>blind</a:t>
+            </a:r>
+            <a:r>
+              <a:rPr/>
+              <a:t> </a:t>
+            </a:r>
+            <a:r>
+              <a:rPr/>
+              <a:t>viewers.</a:t>
+            </a:r>
+            <a:r>
+              <a:rPr/>
+              <a:t> </a:t>
+            </a:r>
+            <a:r>
+              <a:rPr/>
+              <a:t>We’ll</a:t>
+            </a:r>
+            <a:r>
+              <a:rPr/>
+              <a:t> </a:t>
+            </a:r>
+            <a:r>
+              <a:rPr/>
+              <a:t>discuss</a:t>
+            </a:r>
+            <a:r>
+              <a:rPr/>
+              <a:t> </a:t>
+            </a:r>
+            <a:r>
+              <a:rPr/>
+              <a:t>in</a:t>
+            </a:r>
+            <a:r>
+              <a:rPr/>
+              <a:t> </a:t>
+            </a:r>
+            <a:r>
+              <a:rPr/>
+              <a:t>greater</a:t>
+            </a:r>
+            <a:r>
+              <a:rPr/>
+              <a:t> </a:t>
+            </a:r>
+            <a:r>
+              <a:rPr/>
+              <a:t>detail</a:t>
+            </a:r>
+            <a:r>
+              <a:rPr/>
+              <a:t> </a:t>
+            </a:r>
+            <a:r>
+              <a:rPr/>
+              <a:t>in</a:t>
+            </a:r>
+            <a:r>
+              <a:rPr/>
+              <a:t> </a:t>
+            </a:r>
+            <a:r>
+              <a:rPr/>
+              <a:t>just</a:t>
+            </a:r>
+            <a:r>
+              <a:rPr/>
+              <a:t> </a:t>
+            </a:r>
+            <a:r>
+              <a:rPr/>
+              <a:t>a</a:t>
+            </a:r>
+            <a:r>
+              <a:rPr/>
+              <a:t> </a:t>
+            </a:r>
+            <a:r>
+              <a:rPr/>
+              <a:t>bit.</a:t>
+            </a:r>
+          </a:p>
+        </p:txBody>
+      </p:sp>
+      <p:sp>
+        <p:nvSpPr>
+          <p:cNvPr id="4" name="Slide Number Placeholder 3"/>
+          <p:cNvSpPr>
+            <a:spLocks noGrp="1"/>
+          </p:cNvSpPr>
+          <p:nvPr>
+            <p:ph type="sldNum" sz="quarter" idx="10"/>
+          </p:nvPr>
+        </p:nvSpPr>
+        <p:spPr/>
+        <p:txBody>
+          <a:bodyPr/>
+          <a:lstStyle/>
+          <a:p>
+            <a:fld id="{18BDFEC3-8487-43E8-A154-7C12CBC1FFF2}" type="slidenum">
+              <a:rPr lang="en-US"/>
+              <a:t>21</a:t>
+            </a:fld>
+            <a:endParaRPr lang="en-US"/>
+          </a:p>
+        </p:txBody>
+      </p:sp>
+    </p:spTree>
+  </p:cSld>
+</p:notes>
+</file>
+
+<file path=ppt/notesSlides/notesSlide18.xml><?xml version="1.0" encoding="utf-8"?>
+<p:notes xmlns:a="http://schemas.openxmlformats.org/drawingml/2006/main" xmlns:r="http://schemas.openxmlformats.org/officeDocument/2006/relationships" xmlns:p="http://schemas.openxmlformats.org/presentationml/2006/main">
+  <p:cSld>
+    <p:spTree>
+      <p:nvGrpSpPr>
+        <p:cNvPr id="1" name=""/>
+        <p:cNvGrpSpPr/>
+        <p:nvPr/>
+      </p:nvGrpSpPr>
+      <p:grpSpPr>
+        <a:xfrm>
+          <a:off x="0" y="0"/>
+          <a:ext cx="0" cy="0"/>
+          <a:chOff x="0" y="0"/>
+          <a:chExt cx="0" cy="0"/>
+        </a:xfrm>
+      </p:grpSpPr>
+      <p:sp>
+        <p:nvSpPr>
+          <p:cNvPr id="2" name="Slide Image Placeholder 1"/>
+          <p:cNvSpPr>
+            <a:spLocks noGrp="1" noRot="1" noChangeAspect="1"/>
+          </p:cNvSpPr>
+          <p:nvPr>
+            <p:ph type="sldImg"/>
+          </p:nvPr>
+        </p:nvSpPr>
+        <p:spPr/>
+      </p:sp>
+      <p:sp>
+        <p:nvSpPr>
+          <p:cNvPr id="3" name="Notes Placeholder 2"/>
+          <p:cNvSpPr>
+            <a:spLocks noGrp="1"/>
+          </p:cNvSpPr>
+          <p:nvPr>
+            <p:ph type="body" idx="1"/>
+          </p:nvPr>
+        </p:nvSpPr>
+        <p:spPr/>
+        <p:txBody>
+          <a:bodyPr/>
+          <a:lstStyle/>
+          <a:p>
+            <a:pPr lvl="0" marL="0" indent="0">
+              <a:buNone/>
+            </a:pPr>
+            <a:r>
+              <a:rPr/>
+              <a:t>In</a:t>
+            </a:r>
+            <a:r>
+              <a:rPr/>
+              <a:t> </a:t>
+            </a:r>
+            <a:r>
+              <a:rPr/>
+              <a:t>the</a:t>
+            </a:r>
+            <a:r>
+              <a:rPr/>
+              <a:t> </a:t>
+            </a:r>
+            <a:r>
+              <a:rPr/>
+              <a:t>era</a:t>
+            </a:r>
+            <a:r>
+              <a:rPr/>
+              <a:t> </a:t>
+            </a:r>
+            <a:r>
+              <a:rPr/>
+              <a:t>when</a:t>
+            </a:r>
+            <a:r>
+              <a:rPr/>
+              <a:t> </a:t>
+            </a:r>
+            <a:r>
+              <a:rPr/>
+              <a:t>color</a:t>
+            </a:r>
+            <a:r>
+              <a:rPr/>
+              <a:t> </a:t>
+            </a:r>
+            <a:r>
+              <a:rPr/>
+              <a:t>was</a:t>
+            </a:r>
+            <a:r>
+              <a:rPr/>
+              <a:t> </a:t>
+            </a:r>
+            <a:r>
+              <a:rPr/>
+              <a:t>expensive,</a:t>
+            </a:r>
+            <a:r>
+              <a:rPr/>
+              <a:t> </a:t>
+            </a:r>
+            <a:r>
+              <a:rPr/>
+              <a:t>grpahic</a:t>
+            </a:r>
+            <a:r>
+              <a:rPr/>
+              <a:t> </a:t>
+            </a:r>
+            <a:r>
+              <a:rPr/>
+              <a:t>designers</a:t>
+            </a:r>
+            <a:r>
+              <a:rPr/>
+              <a:t> </a:t>
+            </a:r>
+            <a:r>
+              <a:rPr/>
+              <a:t>would</a:t>
+            </a:r>
+            <a:r>
+              <a:rPr/>
+              <a:t> </a:t>
+            </a:r>
+            <a:r>
+              <a:rPr/>
+              <a:t>use</a:t>
+            </a:r>
+            <a:r>
+              <a:rPr/>
+              <a:t> </a:t>
+            </a:r>
+            <a:r>
+              <a:rPr/>
+              <a:t>different</a:t>
+            </a:r>
+            <a:r>
+              <a:rPr/>
+              <a:t> </a:t>
+            </a:r>
+            <a:r>
+              <a:rPr/>
+              <a:t>types</a:t>
+            </a:r>
+            <a:r>
+              <a:rPr/>
+              <a:t> </a:t>
+            </a:r>
+            <a:r>
+              <a:rPr/>
+              <a:t>of</a:t>
+            </a:r>
+            <a:r>
+              <a:rPr/>
+              <a:t> </a:t>
+            </a:r>
+            <a:r>
+              <a:rPr/>
+              <a:t>crosshatching</a:t>
+            </a:r>
+            <a:r>
+              <a:rPr/>
+              <a:t> </a:t>
+            </a:r>
+            <a:r>
+              <a:rPr/>
+              <a:t>in</a:t>
+            </a:r>
+            <a:r>
+              <a:rPr/>
+              <a:t> </a:t>
+            </a:r>
+            <a:r>
+              <a:rPr/>
+              <a:t>place</a:t>
+            </a:r>
+            <a:r>
+              <a:rPr/>
+              <a:t> </a:t>
+            </a:r>
+            <a:r>
+              <a:rPr/>
+              <a:t>of</a:t>
+            </a:r>
+            <a:r>
+              <a:rPr/>
+              <a:t> </a:t>
+            </a:r>
+            <a:r>
+              <a:rPr/>
+              <a:t>colors.</a:t>
+            </a:r>
+            <a:r>
+              <a:rPr/>
+              <a:t> </a:t>
+            </a:r>
+            <a:r>
+              <a:rPr/>
+              <a:t>This</a:t>
+            </a:r>
+            <a:r>
+              <a:rPr/>
+              <a:t> </a:t>
+            </a:r>
+            <a:r>
+              <a:rPr/>
+              <a:t>is</a:t>
+            </a:r>
+            <a:r>
+              <a:rPr/>
+              <a:t> </a:t>
+            </a:r>
+            <a:r>
+              <a:rPr/>
+              <a:t>not</a:t>
+            </a:r>
+            <a:r>
+              <a:rPr/>
+              <a:t> </a:t>
+            </a:r>
+            <a:r>
+              <a:rPr/>
+              <a:t>really</a:t>
+            </a:r>
+            <a:r>
+              <a:rPr/>
+              <a:t> </a:t>
+            </a:r>
+            <a:r>
+              <a:rPr/>
+              <a:t>needed</a:t>
+            </a:r>
+            <a:r>
+              <a:rPr/>
+              <a:t> </a:t>
+            </a:r>
+            <a:r>
+              <a:rPr/>
+              <a:t>today,</a:t>
+            </a:r>
+            <a:r>
+              <a:rPr/>
+              <a:t> </a:t>
+            </a:r>
+            <a:r>
+              <a:rPr/>
+              <a:t>so</a:t>
+            </a:r>
+            <a:r>
+              <a:rPr/>
+              <a:t> </a:t>
+            </a:r>
+            <a:r>
+              <a:rPr/>
+              <a:t>you</a:t>
+            </a:r>
+            <a:r>
+              <a:rPr/>
+              <a:t> </a:t>
+            </a:r>
+            <a:r>
+              <a:rPr/>
+              <a:t>see</a:t>
+            </a:r>
+            <a:r>
+              <a:rPr/>
+              <a:t> </a:t>
+            </a:r>
+            <a:r>
+              <a:rPr/>
+              <a:t>it</a:t>
+            </a:r>
+            <a:r>
+              <a:rPr/>
+              <a:t> </a:t>
+            </a:r>
+            <a:r>
+              <a:rPr/>
+              <a:t>less</a:t>
+            </a:r>
+            <a:r>
+              <a:rPr/>
+              <a:t> </a:t>
+            </a:r>
+            <a:r>
+              <a:rPr/>
+              <a:t>often.</a:t>
+            </a:r>
+            <a:r>
+              <a:rPr/>
+              <a:t> </a:t>
+            </a:r>
+            <a:r>
+              <a:rPr/>
+              <a:t>But</a:t>
+            </a:r>
+            <a:r>
+              <a:rPr/>
+              <a:t> </a:t>
+            </a:r>
+            <a:r>
+              <a:rPr/>
+              <a:t>crosshatching</a:t>
+            </a:r>
+            <a:r>
+              <a:rPr/>
+              <a:t> </a:t>
+            </a:r>
+            <a:r>
+              <a:rPr/>
+              <a:t>can</a:t>
+            </a:r>
+            <a:r>
+              <a:rPr/>
+              <a:t> </a:t>
+            </a:r>
+            <a:r>
+              <a:rPr/>
+              <a:t>often</a:t>
+            </a:r>
+            <a:r>
+              <a:rPr/>
+              <a:t> </a:t>
+            </a:r>
+            <a:r>
+              <a:rPr/>
+              <a:t>produce</a:t>
+            </a:r>
+            <a:r>
+              <a:rPr/>
+              <a:t> </a:t>
+            </a:r>
+            <a:r>
+              <a:rPr/>
+              <a:t>optical</a:t>
+            </a:r>
+            <a:r>
+              <a:rPr/>
+              <a:t> </a:t>
+            </a:r>
+            <a:r>
+              <a:rPr/>
+              <a:t>illusions</a:t>
+            </a:r>
+            <a:r>
+              <a:rPr/>
+              <a:t> </a:t>
+            </a:r>
+            <a:r>
+              <a:rPr/>
+              <a:t>like</a:t>
+            </a:r>
+            <a:r>
+              <a:rPr/>
+              <a:t> </a:t>
+            </a:r>
+            <a:r>
+              <a:rPr/>
+              <a:t>the</a:t>
+            </a:r>
+            <a:r>
+              <a:rPr/>
+              <a:t> </a:t>
+            </a:r>
+            <a:r>
+              <a:rPr/>
+              <a:t>one</a:t>
+            </a:r>
+            <a:r>
+              <a:rPr/>
+              <a:t> </a:t>
+            </a:r>
+            <a:r>
+              <a:rPr/>
+              <a:t>shown</a:t>
+            </a:r>
+            <a:r>
+              <a:rPr/>
+              <a:t> </a:t>
+            </a:r>
+            <a:r>
+              <a:rPr/>
+              <a:t>above.</a:t>
+            </a:r>
+          </a:p>
+        </p:txBody>
+      </p:sp>
+      <p:sp>
+        <p:nvSpPr>
+          <p:cNvPr id="4" name="Slide Number Placeholder 3"/>
+          <p:cNvSpPr>
+            <a:spLocks noGrp="1"/>
+          </p:cNvSpPr>
+          <p:nvPr>
+            <p:ph type="sldNum" sz="quarter" idx="10"/>
+          </p:nvPr>
+        </p:nvSpPr>
+        <p:spPr/>
+        <p:txBody>
+          <a:bodyPr/>
+          <a:lstStyle/>
+          <a:p>
+            <a:fld id="{18BDFEC3-8487-43E8-A154-7C12CBC1FFF2}" type="slidenum">
+              <a:rPr lang="en-US"/>
+              <a:t>24</a:t>
+            </a:fld>
+            <a:endParaRPr lang="en-US"/>
+          </a:p>
+        </p:txBody>
+      </p:sp>
+    </p:spTree>
+  </p:cSld>
+</p:notes>
+</file>
+
+<file path=ppt/notesSlides/notesSlide19.xml><?xml version="1.0" encoding="utf-8"?>
+<p:notes xmlns:a="http://schemas.openxmlformats.org/drawingml/2006/main" xmlns:r="http://schemas.openxmlformats.org/officeDocument/2006/relationships" xmlns:p="http://schemas.openxmlformats.org/presentationml/2006/main">
+  <p:cSld>
+    <p:spTree>
+      <p:nvGrpSpPr>
+        <p:cNvPr id="1" name=""/>
+        <p:cNvGrpSpPr/>
+        <p:nvPr/>
+      </p:nvGrpSpPr>
+      <p:grpSpPr>
+        <a:xfrm>
+          <a:off x="0" y="0"/>
+          <a:ext cx="0" cy="0"/>
+          <a:chOff x="0" y="0"/>
+          <a:chExt cx="0" cy="0"/>
+        </a:xfrm>
+      </p:grpSpPr>
+      <p:sp>
+        <p:nvSpPr>
+          <p:cNvPr id="2" name="Slide Image Placeholder 1"/>
+          <p:cNvSpPr>
+            <a:spLocks noGrp="1" noRot="1" noChangeAspect="1"/>
+          </p:cNvSpPr>
+          <p:nvPr>
+            <p:ph type="sldImg"/>
+          </p:nvPr>
+        </p:nvSpPr>
+        <p:spPr/>
+      </p:sp>
+      <p:sp>
+        <p:nvSpPr>
+          <p:cNvPr id="3" name="Notes Placeholder 2"/>
+          <p:cNvSpPr>
+            <a:spLocks noGrp="1"/>
+          </p:cNvSpPr>
+          <p:nvPr>
+            <p:ph type="body" idx="1"/>
+          </p:nvPr>
+        </p:nvSpPr>
+        <p:spPr/>
+        <p:txBody>
+          <a:bodyPr/>
+          <a:lstStyle/>
+          <a:p>
+            <a:pPr lvl="0" marL="0" indent="0">
+              <a:buNone/>
+            </a:pPr>
+            <a:r>
+              <a:rPr/>
+              <a:t>Many</a:t>
+            </a:r>
+            <a:r>
+              <a:rPr/>
+              <a:t> </a:t>
+            </a:r>
+            <a:r>
+              <a:rPr/>
+              <a:t>of</a:t>
+            </a:r>
+            <a:r>
+              <a:rPr/>
+              <a:t> </a:t>
+            </a:r>
+            <a:r>
+              <a:rPr/>
+              <a:t>the</a:t>
+            </a:r>
+            <a:r>
+              <a:rPr/>
+              <a:t> </a:t>
+            </a:r>
+            <a:r>
+              <a:rPr/>
+              <a:t>color</a:t>
+            </a:r>
+            <a:r>
+              <a:rPr/>
+              <a:t> </a:t>
+            </a:r>
+            <a:r>
+              <a:rPr/>
+              <a:t>palettes</a:t>
+            </a:r>
+            <a:r>
+              <a:rPr/>
+              <a:t> </a:t>
+            </a:r>
+            <a:r>
+              <a:rPr/>
+              <a:t>used</a:t>
+            </a:r>
+            <a:r>
+              <a:rPr/>
+              <a:t> </a:t>
+            </a:r>
+            <a:r>
+              <a:rPr/>
+              <a:t>here</a:t>
+            </a:r>
+            <a:r>
+              <a:rPr/>
+              <a:t> </a:t>
+            </a:r>
+            <a:r>
+              <a:rPr/>
+              <a:t>cause</a:t>
+            </a:r>
+            <a:r>
+              <a:rPr/>
+              <a:t> </a:t>
+            </a:r>
+            <a:r>
+              <a:rPr/>
+              <a:t>difficulty</a:t>
+            </a:r>
+            <a:r>
+              <a:rPr/>
+              <a:t> </a:t>
+            </a:r>
+            <a:r>
+              <a:rPr/>
+              <a:t>for</a:t>
+            </a:r>
+            <a:r>
+              <a:rPr/>
+              <a:t> </a:t>
+            </a:r>
+            <a:r>
+              <a:rPr/>
+              <a:t>color</a:t>
+            </a:r>
+            <a:r>
+              <a:rPr/>
+              <a:t> </a:t>
+            </a:r>
+            <a:r>
+              <a:rPr/>
+              <a:t>blind</a:t>
+            </a:r>
+            <a:r>
+              <a:rPr/>
+              <a:t> </a:t>
+            </a:r>
+            <a:r>
+              <a:rPr/>
+              <a:t>people.</a:t>
             </a:r>
           </a:p>
         </p:txBody>
@@ -4385,6 +5579,1268 @@
             <a:fld id="{18BDFEC3-8487-43E8-A154-7C12CBC1FFF2}" type="slidenum">
               <a:rPr lang="en-US"/>
               <a:t>3</a:t>
+            </a:fld>
+            <a:endParaRPr lang="en-US"/>
+          </a:p>
+        </p:txBody>
+      </p:sp>
+    </p:spTree>
+  </p:cSld>
+</p:notes>
+</file>
+
+<file path=ppt/notesSlides/notesSlide20.xml><?xml version="1.0" encoding="utf-8"?>
+<p:notes xmlns:a="http://schemas.openxmlformats.org/drawingml/2006/main" xmlns:r="http://schemas.openxmlformats.org/officeDocument/2006/relationships" xmlns:p="http://schemas.openxmlformats.org/presentationml/2006/main">
+  <p:cSld>
+    <p:spTree>
+      <p:nvGrpSpPr>
+        <p:cNvPr id="1" name=""/>
+        <p:cNvGrpSpPr/>
+        <p:nvPr/>
+      </p:nvGrpSpPr>
+      <p:grpSpPr>
+        <a:xfrm>
+          <a:off x="0" y="0"/>
+          <a:ext cx="0" cy="0"/>
+          <a:chOff x="0" y="0"/>
+          <a:chExt cx="0" cy="0"/>
+        </a:xfrm>
+      </p:grpSpPr>
+      <p:sp>
+        <p:nvSpPr>
+          <p:cNvPr id="2" name="Slide Image Placeholder 1"/>
+          <p:cNvSpPr>
+            <a:spLocks noGrp="1" noRot="1" noChangeAspect="1"/>
+          </p:cNvSpPr>
+          <p:nvPr>
+            <p:ph type="sldImg"/>
+          </p:nvPr>
+        </p:nvSpPr>
+        <p:spPr/>
+      </p:sp>
+      <p:sp>
+        <p:nvSpPr>
+          <p:cNvPr id="3" name="Notes Placeholder 2"/>
+          <p:cNvSpPr>
+            <a:spLocks noGrp="1"/>
+          </p:cNvSpPr>
+          <p:nvPr>
+            <p:ph type="body" idx="1"/>
+          </p:nvPr>
+        </p:nvSpPr>
+        <p:spPr/>
+        <p:txBody>
+          <a:bodyPr/>
+          <a:lstStyle/>
+          <a:p>
+            <a:pPr lvl="0" marL="0" indent="0">
+              <a:buNone/>
+            </a:pPr>
+            <a:r>
+              <a:rPr/>
+              <a:t>This</a:t>
+            </a:r>
+            <a:r>
+              <a:rPr/>
+              <a:t> </a:t>
+            </a:r>
+            <a:r>
+              <a:rPr/>
+              <a:t>is</a:t>
+            </a:r>
+            <a:r>
+              <a:rPr/>
+              <a:t> </a:t>
+            </a:r>
+            <a:r>
+              <a:rPr/>
+              <a:t>one</a:t>
+            </a:r>
+            <a:r>
+              <a:rPr/>
+              <a:t> </a:t>
+            </a:r>
+            <a:r>
+              <a:rPr/>
+              <a:t>of</a:t>
+            </a:r>
+            <a:r>
+              <a:rPr/>
+              <a:t> </a:t>
+            </a:r>
+            <a:r>
+              <a:rPr/>
+              <a:t>many</a:t>
+            </a:r>
+            <a:r>
+              <a:rPr/>
+              <a:t> </a:t>
+            </a:r>
+            <a:r>
+              <a:rPr/>
+              <a:t>color</a:t>
+            </a:r>
+            <a:r>
+              <a:rPr/>
+              <a:t> </a:t>
+            </a:r>
+            <a:r>
+              <a:rPr/>
+              <a:t>blind</a:t>
+            </a:r>
+            <a:r>
+              <a:rPr/>
+              <a:t> </a:t>
+            </a:r>
+            <a:r>
+              <a:rPr/>
+              <a:t>simulators</a:t>
+            </a:r>
+            <a:r>
+              <a:rPr/>
+              <a:t> </a:t>
+            </a:r>
+            <a:r>
+              <a:rPr/>
+              <a:t>available</a:t>
+            </a:r>
+            <a:r>
+              <a:rPr/>
+              <a:t> </a:t>
+            </a:r>
+            <a:r>
+              <a:rPr/>
+              <a:t>on</a:t>
+            </a:r>
+            <a:r>
+              <a:rPr/>
+              <a:t> </a:t>
+            </a:r>
+            <a:r>
+              <a:rPr/>
+              <a:t>the</a:t>
+            </a:r>
+            <a:r>
+              <a:rPr/>
+              <a:t> </a:t>
+            </a:r>
+            <a:r>
+              <a:rPr/>
+              <a:t>web.</a:t>
+            </a:r>
+          </a:p>
+        </p:txBody>
+      </p:sp>
+      <p:sp>
+        <p:nvSpPr>
+          <p:cNvPr id="4" name="Slide Number Placeholder 3"/>
+          <p:cNvSpPr>
+            <a:spLocks noGrp="1"/>
+          </p:cNvSpPr>
+          <p:nvPr>
+            <p:ph type="sldNum" sz="quarter" idx="10"/>
+          </p:nvPr>
+        </p:nvSpPr>
+        <p:spPr/>
+        <p:txBody>
+          <a:bodyPr/>
+          <a:lstStyle/>
+          <a:p>
+            <a:fld id="{18BDFEC3-8487-43E8-A154-7C12CBC1FFF2}" type="slidenum">
+              <a:rPr lang="en-US"/>
+              <a:t>26</a:t>
+            </a:fld>
+            <a:endParaRPr lang="en-US"/>
+          </a:p>
+        </p:txBody>
+      </p:sp>
+    </p:spTree>
+  </p:cSld>
+</p:notes>
+</file>
+
+<file path=ppt/notesSlides/notesSlide21.xml><?xml version="1.0" encoding="utf-8"?>
+<p:notes xmlns:a="http://schemas.openxmlformats.org/drawingml/2006/main" xmlns:r="http://schemas.openxmlformats.org/officeDocument/2006/relationships" xmlns:p="http://schemas.openxmlformats.org/presentationml/2006/main">
+  <p:cSld>
+    <p:spTree>
+      <p:nvGrpSpPr>
+        <p:cNvPr id="1" name=""/>
+        <p:cNvGrpSpPr/>
+        <p:nvPr/>
+      </p:nvGrpSpPr>
+      <p:grpSpPr>
+        <a:xfrm>
+          <a:off x="0" y="0"/>
+          <a:ext cx="0" cy="0"/>
+          <a:chOff x="0" y="0"/>
+          <a:chExt cx="0" cy="0"/>
+        </a:xfrm>
+      </p:grpSpPr>
+      <p:sp>
+        <p:nvSpPr>
+          <p:cNvPr id="2" name="Slide Image Placeholder 1"/>
+          <p:cNvSpPr>
+            <a:spLocks noGrp="1" noRot="1" noChangeAspect="1"/>
+          </p:cNvSpPr>
+          <p:nvPr>
+            <p:ph type="sldImg"/>
+          </p:nvPr>
+        </p:nvSpPr>
+        <p:spPr/>
+      </p:sp>
+      <p:sp>
+        <p:nvSpPr>
+          <p:cNvPr id="3" name="Notes Placeholder 2"/>
+          <p:cNvSpPr>
+            <a:spLocks noGrp="1"/>
+          </p:cNvSpPr>
+          <p:nvPr>
+            <p:ph type="body" idx="1"/>
+          </p:nvPr>
+        </p:nvSpPr>
+        <p:spPr/>
+        <p:txBody>
+          <a:bodyPr/>
+          <a:lstStyle/>
+          <a:p>
+            <a:pPr lvl="0" marL="0" indent="0">
+              <a:buNone/>
+            </a:pPr>
+            <a:r>
+              <a:rPr/>
+              <a:t>In</a:t>
+            </a:r>
+            <a:r>
+              <a:rPr/>
+              <a:t> </a:t>
+            </a:r>
+            <a:r>
+              <a:rPr/>
+              <a:t>general,</a:t>
+            </a:r>
+            <a:r>
+              <a:rPr/>
+              <a:t> </a:t>
+            </a:r>
+            <a:r>
+              <a:rPr/>
+              <a:t>equal</a:t>
+            </a:r>
+            <a:r>
+              <a:rPr/>
+              <a:t> </a:t>
+            </a:r>
+            <a:r>
+              <a:rPr/>
+              <a:t>luminance</a:t>
+            </a:r>
+            <a:r>
+              <a:rPr/>
+              <a:t> </a:t>
+            </a:r>
+            <a:r>
+              <a:rPr/>
+              <a:t>palettes</a:t>
+            </a:r>
+            <a:r>
+              <a:rPr/>
+              <a:t> </a:t>
+            </a:r>
+            <a:r>
+              <a:rPr/>
+              <a:t>for</a:t>
+            </a:r>
+            <a:r>
+              <a:rPr/>
+              <a:t> </a:t>
+            </a:r>
+            <a:r>
+              <a:rPr/>
+              <a:t>categorical</a:t>
+            </a:r>
+            <a:r>
+              <a:rPr/>
+              <a:t> </a:t>
+            </a:r>
+            <a:r>
+              <a:rPr/>
+              <a:t>data</a:t>
+            </a:r>
+            <a:r>
+              <a:rPr/>
+              <a:t> </a:t>
+            </a:r>
+            <a:r>
+              <a:rPr/>
+              <a:t>are</a:t>
+            </a:r>
+            <a:r>
+              <a:rPr/>
+              <a:t> </a:t>
+            </a:r>
+            <a:r>
+              <a:rPr/>
+              <a:t>the</a:t>
+            </a:r>
+            <a:r>
+              <a:rPr/>
+              <a:t> </a:t>
+            </a:r>
+            <a:r>
+              <a:rPr/>
+              <a:t>most</a:t>
+            </a:r>
+            <a:r>
+              <a:rPr/>
+              <a:t> </a:t>
+            </a:r>
+            <a:r>
+              <a:rPr/>
+              <a:t>likely</a:t>
+            </a:r>
+            <a:r>
+              <a:rPr/>
+              <a:t> </a:t>
+            </a:r>
+            <a:r>
+              <a:rPr/>
+              <a:t>to</a:t>
+            </a:r>
+            <a:r>
+              <a:rPr/>
+              <a:t> </a:t>
+            </a:r>
+            <a:r>
+              <a:rPr/>
+              <a:t>cause</a:t>
+            </a:r>
+            <a:r>
+              <a:rPr/>
+              <a:t> </a:t>
+            </a:r>
+            <a:r>
+              <a:rPr/>
+              <a:t>difficulty</a:t>
+            </a:r>
+            <a:r>
+              <a:rPr/>
+              <a:t> </a:t>
+            </a:r>
+            <a:r>
+              <a:rPr/>
+              <a:t>for</a:t>
+            </a:r>
+            <a:r>
+              <a:rPr/>
+              <a:t> </a:t>
+            </a:r>
+            <a:r>
+              <a:rPr/>
+              <a:t>color</a:t>
+            </a:r>
+            <a:r>
+              <a:rPr/>
+              <a:t> </a:t>
+            </a:r>
+            <a:r>
+              <a:rPr/>
+              <a:t>blind</a:t>
+            </a:r>
+            <a:r>
+              <a:rPr/>
+              <a:t> </a:t>
+            </a:r>
+            <a:r>
+              <a:rPr/>
+              <a:t>viewers.</a:t>
+            </a:r>
+            <a:r>
+              <a:rPr/>
+              <a:t> </a:t>
+            </a:r>
+            <a:r>
+              <a:rPr/>
+              <a:t>The</a:t>
+            </a:r>
+            <a:r>
+              <a:rPr/>
+              <a:t> </a:t>
+            </a:r>
+            <a:r>
+              <a:rPr/>
+              <a:t>single</a:t>
+            </a:r>
+            <a:r>
+              <a:rPr/>
+              <a:t> </a:t>
+            </a:r>
+            <a:r>
+              <a:rPr/>
+              <a:t>gradients</a:t>
+            </a:r>
+            <a:r>
+              <a:rPr/>
+              <a:t> </a:t>
+            </a:r>
+            <a:r>
+              <a:rPr/>
+              <a:t>and</a:t>
+            </a:r>
+            <a:r>
+              <a:rPr/>
+              <a:t> </a:t>
+            </a:r>
+            <a:r>
+              <a:rPr/>
+              <a:t>divergent</a:t>
+            </a:r>
+            <a:r>
+              <a:rPr/>
+              <a:t> </a:t>
+            </a:r>
+            <a:r>
+              <a:rPr/>
+              <a:t>gradients</a:t>
+            </a:r>
+            <a:r>
+              <a:rPr/>
+              <a:t> </a:t>
+            </a:r>
+            <a:r>
+              <a:rPr/>
+              <a:t>will</a:t>
+            </a:r>
+            <a:r>
+              <a:rPr/>
+              <a:t> </a:t>
+            </a:r>
+            <a:r>
+              <a:rPr/>
+              <a:t>usually</a:t>
+            </a:r>
+            <a:r>
+              <a:rPr/>
+              <a:t> </a:t>
+            </a:r>
+            <a:r>
+              <a:rPr/>
+              <a:t>have</a:t>
+            </a:r>
+            <a:r>
+              <a:rPr/>
+              <a:t> </a:t>
+            </a:r>
+            <a:r>
+              <a:rPr/>
+              <a:t>other</a:t>
+            </a:r>
+            <a:r>
+              <a:rPr/>
+              <a:t> </a:t>
+            </a:r>
+            <a:r>
+              <a:rPr/>
+              <a:t>changes</a:t>
+            </a:r>
+            <a:r>
+              <a:rPr/>
+              <a:t> </a:t>
+            </a:r>
+            <a:r>
+              <a:rPr/>
+              <a:t>in</a:t>
+            </a:r>
+            <a:r>
+              <a:rPr/>
+              <a:t> </a:t>
+            </a:r>
+            <a:r>
+              <a:rPr/>
+              <a:t>luminance</a:t>
+            </a:r>
+            <a:r>
+              <a:rPr/>
+              <a:t> </a:t>
+            </a:r>
+            <a:r>
+              <a:rPr/>
+              <a:t>that</a:t>
+            </a:r>
+            <a:r>
+              <a:rPr/>
+              <a:t> </a:t>
+            </a:r>
+            <a:r>
+              <a:rPr/>
+              <a:t>can</a:t>
+            </a:r>
+            <a:r>
+              <a:rPr/>
+              <a:t> </a:t>
+            </a:r>
+            <a:r>
+              <a:rPr/>
+              <a:t>help</a:t>
+            </a:r>
+            <a:r>
+              <a:rPr/>
+              <a:t> </a:t>
+            </a:r>
+            <a:r>
+              <a:rPr/>
+              <a:t>color</a:t>
+            </a:r>
+            <a:r>
+              <a:rPr/>
+              <a:t> </a:t>
+            </a:r>
+            <a:r>
+              <a:rPr/>
+              <a:t>blind</a:t>
+            </a:r>
+            <a:r>
+              <a:rPr/>
+              <a:t> </a:t>
+            </a:r>
+            <a:r>
+              <a:rPr/>
+              <a:t>viewers.</a:t>
+            </a:r>
+          </a:p>
+          <a:p>
+            <a:pPr lvl="0" marL="0" indent="0">
+              <a:buNone/>
+            </a:pPr>
+          </a:p>
+          <a:p>
+            <a:pPr lvl="0" marL="0" indent="0">
+              <a:buNone/>
+            </a:pPr>
+            <a:r>
+              <a:rPr/>
+              <a:t>There</a:t>
+            </a:r>
+            <a:r>
+              <a:rPr/>
+              <a:t> </a:t>
+            </a:r>
+            <a:r>
+              <a:rPr/>
+              <a:t>are</a:t>
+            </a:r>
+            <a:r>
+              <a:rPr/>
+              <a:t> </a:t>
+            </a:r>
+            <a:r>
+              <a:rPr/>
+              <a:t>palettes</a:t>
+            </a:r>
+            <a:r>
+              <a:rPr/>
+              <a:t> </a:t>
+            </a:r>
+            <a:r>
+              <a:rPr/>
+              <a:t>that</a:t>
+            </a:r>
+            <a:r>
+              <a:rPr/>
+              <a:t> </a:t>
+            </a:r>
+            <a:r>
+              <a:rPr/>
+              <a:t>are</a:t>
+            </a:r>
+            <a:r>
+              <a:rPr/>
+              <a:t> </a:t>
+            </a:r>
+            <a:r>
+              <a:rPr/>
+              <a:t>known</a:t>
+            </a:r>
+            <a:r>
+              <a:rPr/>
+              <a:t> </a:t>
+            </a:r>
+            <a:r>
+              <a:rPr/>
+              <a:t>to</a:t>
+            </a:r>
+            <a:r>
+              <a:rPr/>
+              <a:t> </a:t>
+            </a:r>
+            <a:r>
+              <a:rPr/>
+              <a:t>be</a:t>
+            </a:r>
+            <a:r>
+              <a:rPr/>
+              <a:t> </a:t>
+            </a:r>
+            <a:r>
+              <a:rPr/>
+              <a:t>color</a:t>
+            </a:r>
+            <a:r>
+              <a:rPr/>
+              <a:t> </a:t>
+            </a:r>
+            <a:r>
+              <a:rPr/>
+              <a:t>blind</a:t>
+            </a:r>
+            <a:r>
+              <a:rPr/>
+              <a:t> </a:t>
+            </a:r>
+            <a:r>
+              <a:rPr/>
+              <a:t>friendly,</a:t>
+            </a:r>
+            <a:r>
+              <a:rPr/>
+              <a:t> </a:t>
+            </a:r>
+            <a:r>
+              <a:rPr/>
+              <a:t>meaning</a:t>
+            </a:r>
+            <a:r>
+              <a:rPr/>
+              <a:t> </a:t>
+            </a:r>
+            <a:r>
+              <a:rPr/>
+              <a:t>that</a:t>
+            </a:r>
+            <a:r>
+              <a:rPr/>
+              <a:t> </a:t>
+            </a:r>
+            <a:r>
+              <a:rPr/>
+              <a:t>the</a:t>
+            </a:r>
+            <a:r>
+              <a:rPr/>
+              <a:t> </a:t>
+            </a:r>
+            <a:r>
+              <a:rPr/>
+              <a:t>colors</a:t>
+            </a:r>
+            <a:r>
+              <a:rPr/>
+              <a:t> </a:t>
+            </a:r>
+            <a:r>
+              <a:rPr/>
+              <a:t>are</a:t>
+            </a:r>
+            <a:r>
+              <a:rPr/>
+              <a:t> </a:t>
+            </a:r>
+            <a:r>
+              <a:rPr/>
+              <a:t>easily</a:t>
+            </a:r>
+            <a:r>
+              <a:rPr/>
+              <a:t> </a:t>
+            </a:r>
+            <a:r>
+              <a:rPr/>
+              <a:t>distinguishable</a:t>
+            </a:r>
+            <a:r>
+              <a:rPr/>
+              <a:t> </a:t>
+            </a:r>
+            <a:r>
+              <a:rPr/>
+              <a:t>even</a:t>
+            </a:r>
+            <a:r>
+              <a:rPr/>
+              <a:t> </a:t>
+            </a:r>
+            <a:r>
+              <a:rPr/>
+              <a:t>for</a:t>
+            </a:r>
+            <a:r>
+              <a:rPr/>
+              <a:t> </a:t>
+            </a:r>
+            <a:r>
+              <a:rPr/>
+              <a:t>someone</a:t>
+            </a:r>
+            <a:r>
+              <a:rPr/>
+              <a:t> </a:t>
+            </a:r>
+            <a:r>
+              <a:rPr/>
+              <a:t>who</a:t>
+            </a:r>
+            <a:r>
+              <a:rPr/>
+              <a:t> </a:t>
+            </a:r>
+            <a:r>
+              <a:rPr/>
+              <a:t>is</a:t>
+            </a:r>
+            <a:r>
+              <a:rPr/>
+              <a:t> </a:t>
+            </a:r>
+            <a:r>
+              <a:rPr/>
+              <a:t>color</a:t>
+            </a:r>
+            <a:r>
+              <a:rPr/>
+              <a:t> </a:t>
+            </a:r>
+            <a:r>
+              <a:rPr/>
+              <a:t>blind.</a:t>
+            </a:r>
+          </a:p>
+          <a:p>
+            <a:pPr lvl="0" marL="0" indent="0">
+              <a:buNone/>
+            </a:pPr>
+          </a:p>
+          <a:p>
+            <a:pPr lvl="0" marL="0" indent="0">
+              <a:buNone/>
+            </a:pPr>
+            <a:r>
+              <a:rPr/>
+              <a:t>It</a:t>
+            </a:r>
+            <a:r>
+              <a:rPr/>
+              <a:t> </a:t>
+            </a:r>
+            <a:r>
+              <a:rPr/>
+              <a:t>helps</a:t>
+            </a:r>
+            <a:r>
+              <a:rPr/>
+              <a:t> </a:t>
+            </a:r>
+            <a:r>
+              <a:rPr/>
+              <a:t>all</a:t>
+            </a:r>
+            <a:r>
+              <a:rPr/>
+              <a:t> </a:t>
+            </a:r>
+            <a:r>
+              <a:rPr/>
+              <a:t>of</a:t>
+            </a:r>
+            <a:r>
+              <a:rPr/>
+              <a:t> </a:t>
+            </a:r>
+            <a:r>
+              <a:rPr/>
+              <a:t>us,</a:t>
+            </a:r>
+            <a:r>
+              <a:rPr/>
+              <a:t> </a:t>
+            </a:r>
+            <a:r>
+              <a:rPr/>
+              <a:t>but</a:t>
+            </a:r>
+            <a:r>
+              <a:rPr/>
+              <a:t> </a:t>
+            </a:r>
+            <a:r>
+              <a:rPr/>
+              <a:t>especially</a:t>
+            </a:r>
+            <a:r>
+              <a:rPr/>
+              <a:t> </a:t>
+            </a:r>
+            <a:r>
+              <a:rPr/>
+              <a:t>color</a:t>
+            </a:r>
+            <a:r>
+              <a:rPr/>
+              <a:t> </a:t>
+            </a:r>
+            <a:r>
+              <a:rPr/>
+              <a:t>blind</a:t>
+            </a:r>
+            <a:r>
+              <a:rPr/>
+              <a:t> </a:t>
+            </a:r>
+            <a:r>
+              <a:rPr/>
+              <a:t>viewers</a:t>
+            </a:r>
+            <a:r>
+              <a:rPr/>
+              <a:t> </a:t>
+            </a:r>
+            <a:r>
+              <a:rPr/>
+              <a:t>if</a:t>
+            </a:r>
+            <a:r>
+              <a:rPr/>
+              <a:t> </a:t>
+            </a:r>
+            <a:r>
+              <a:rPr/>
+              <a:t>you</a:t>
+            </a:r>
+            <a:r>
+              <a:rPr/>
+              <a:t> </a:t>
+            </a:r>
+            <a:r>
+              <a:rPr/>
+              <a:t>can</a:t>
+            </a:r>
+            <a:r>
+              <a:rPr/>
+              <a:t> </a:t>
+            </a:r>
+            <a:r>
+              <a:rPr/>
+              <a:t>find</a:t>
+            </a:r>
+            <a:r>
+              <a:rPr/>
+              <a:t> </a:t>
+            </a:r>
+            <a:r>
+              <a:rPr/>
+              <a:t>a</a:t>
+            </a:r>
+            <a:r>
+              <a:rPr/>
+              <a:t> </a:t>
+            </a:r>
+            <a:r>
+              <a:rPr/>
+              <a:t>second</a:t>
+            </a:r>
+            <a:r>
+              <a:rPr/>
+              <a:t> </a:t>
+            </a:r>
+            <a:r>
+              <a:rPr/>
+              <a:t>way</a:t>
+            </a:r>
+            <a:r>
+              <a:rPr/>
+              <a:t> </a:t>
+            </a:r>
+            <a:r>
+              <a:rPr/>
+              <a:t>to</a:t>
+            </a:r>
+            <a:r>
+              <a:rPr/>
+              <a:t> </a:t>
+            </a:r>
+            <a:r>
+              <a:rPr/>
+              <a:t>code</a:t>
+            </a:r>
+            <a:r>
+              <a:rPr/>
+              <a:t> </a:t>
+            </a:r>
+            <a:r>
+              <a:rPr/>
+              <a:t>a</a:t>
+            </a:r>
+            <a:r>
+              <a:rPr/>
+              <a:t> </a:t>
+            </a:r>
+            <a:r>
+              <a:rPr/>
+              <a:t>variable.</a:t>
+            </a:r>
+            <a:r>
+              <a:rPr/>
+              <a:t> </a:t>
+            </a:r>
+            <a:r>
+              <a:rPr/>
+              <a:t>This</a:t>
+            </a:r>
+            <a:r>
+              <a:rPr/>
+              <a:t> </a:t>
+            </a:r>
+            <a:r>
+              <a:rPr/>
+              <a:t>is</a:t>
+            </a:r>
+            <a:r>
+              <a:rPr/>
+              <a:t> </a:t>
+            </a:r>
+            <a:r>
+              <a:rPr/>
+              <a:t>fairly</a:t>
+            </a:r>
+            <a:r>
+              <a:rPr/>
+              <a:t> </a:t>
+            </a:r>
+            <a:r>
+              <a:rPr/>
+              <a:t>easy</a:t>
+            </a:r>
+            <a:r>
+              <a:rPr/>
+              <a:t> </a:t>
+            </a:r>
+            <a:r>
+              <a:rPr/>
+              <a:t>to</a:t>
+            </a:r>
+            <a:r>
+              <a:rPr/>
+              <a:t> </a:t>
+            </a:r>
+            <a:r>
+              <a:rPr/>
+              <a:t>do</a:t>
+            </a:r>
+            <a:r>
+              <a:rPr/>
+              <a:t> </a:t>
+            </a:r>
+            <a:r>
+              <a:rPr/>
+              <a:t>using</a:t>
+            </a:r>
+            <a:r>
+              <a:rPr/>
+              <a:t> </a:t>
+            </a:r>
+            <a:r>
+              <a:rPr/>
+              <a:t>shape</a:t>
+            </a:r>
+            <a:r>
+              <a:rPr/>
+              <a:t> </a:t>
+            </a:r>
+            <a:r>
+              <a:rPr/>
+              <a:t>as</a:t>
+            </a:r>
+            <a:r>
+              <a:rPr/>
+              <a:t> </a:t>
+            </a:r>
+            <a:r>
+              <a:rPr/>
+              <a:t>well</a:t>
+            </a:r>
+            <a:r>
+              <a:rPr/>
+              <a:t> </a:t>
+            </a:r>
+            <a:r>
+              <a:rPr/>
+              <a:t>as</a:t>
+            </a:r>
+            <a:r>
+              <a:rPr/>
+              <a:t> </a:t>
+            </a:r>
+            <a:r>
+              <a:rPr/>
+              <a:t>color</a:t>
+            </a:r>
+            <a:r>
+              <a:rPr/>
+              <a:t> </a:t>
+            </a:r>
+            <a:r>
+              <a:rPr/>
+              <a:t>to</a:t>
+            </a:r>
+            <a:r>
+              <a:rPr/>
+              <a:t> </a:t>
+            </a:r>
+            <a:r>
+              <a:rPr/>
+              <a:t>encode</a:t>
+            </a:r>
+            <a:r>
+              <a:rPr/>
+              <a:t> </a:t>
+            </a:r>
+            <a:r>
+              <a:rPr/>
+              <a:t>a</a:t>
+            </a:r>
+            <a:r>
+              <a:rPr/>
+              <a:t> </a:t>
+            </a:r>
+            <a:r>
+              <a:rPr/>
+              <a:t>categorical</a:t>
+            </a:r>
+            <a:r>
+              <a:rPr/>
+              <a:t> </a:t>
+            </a:r>
+            <a:r>
+              <a:rPr/>
+              <a:t>variable.</a:t>
+            </a:r>
+          </a:p>
+          <a:p>
+            <a:pPr lvl="0" marL="0" indent="0">
+              <a:buNone/>
+            </a:pPr>
+          </a:p>
+          <a:p>
+            <a:pPr lvl="0" marL="0" indent="0">
+              <a:buNone/>
+            </a:pPr>
+            <a:r>
+              <a:rPr/>
+              <a:t>You</a:t>
+            </a:r>
+            <a:r>
+              <a:rPr/>
+              <a:t> </a:t>
+            </a:r>
+            <a:r>
+              <a:rPr/>
+              <a:t>can</a:t>
+            </a:r>
+            <a:r>
+              <a:rPr/>
+              <a:t> </a:t>
+            </a:r>
+            <a:r>
+              <a:rPr/>
+              <a:t>also</a:t>
+            </a:r>
+            <a:r>
+              <a:rPr/>
+              <a:t> </a:t>
+            </a:r>
+            <a:r>
+              <a:rPr/>
+              <a:t>ignore</a:t>
+            </a:r>
+            <a:r>
+              <a:rPr/>
+              <a:t> </a:t>
+            </a:r>
+            <a:r>
+              <a:rPr/>
+              <a:t>the</a:t>
+            </a:r>
+            <a:r>
+              <a:rPr/>
+              <a:t> </a:t>
+            </a:r>
+            <a:r>
+              <a:rPr/>
+              <a:t>previous</a:t>
+            </a:r>
+            <a:r>
+              <a:rPr/>
+              <a:t> </a:t>
+            </a:r>
+            <a:r>
+              <a:rPr/>
+              <a:t>efforts</a:t>
+            </a:r>
+            <a:r>
+              <a:rPr/>
+              <a:t> </a:t>
+            </a:r>
+            <a:r>
+              <a:rPr/>
+              <a:t>to</a:t>
+            </a:r>
+            <a:r>
+              <a:rPr/>
+              <a:t> </a:t>
+            </a:r>
+            <a:r>
+              <a:rPr/>
+              <a:t>balance</a:t>
+            </a:r>
+            <a:r>
+              <a:rPr/>
+              <a:t> </a:t>
+            </a:r>
+            <a:r>
+              <a:rPr/>
+              <a:t>luminance</a:t>
+            </a:r>
+            <a:r>
+              <a:rPr/>
+              <a:t> </a:t>
+            </a:r>
+            <a:r>
+              <a:rPr/>
+              <a:t>and</a:t>
+            </a:r>
+            <a:r>
+              <a:rPr/>
+              <a:t> </a:t>
+            </a:r>
+            <a:r>
+              <a:rPr/>
+              <a:t>deliberately</a:t>
+            </a:r>
+            <a:r>
+              <a:rPr/>
+              <a:t> </a:t>
+            </a:r>
+            <a:r>
+              <a:rPr/>
+              <a:t>vary</a:t>
+            </a:r>
+            <a:r>
+              <a:rPr/>
+              <a:t> </a:t>
+            </a:r>
+            <a:r>
+              <a:rPr/>
+              <a:t>luminance,</a:t>
+            </a:r>
+            <a:r>
+              <a:rPr/>
+              <a:t> </a:t>
+            </a:r>
+            <a:r>
+              <a:rPr/>
+              <a:t>as</a:t>
+            </a:r>
+            <a:r>
+              <a:rPr/>
+              <a:t> </a:t>
+            </a:r>
+            <a:r>
+              <a:rPr/>
+              <a:t>this</a:t>
+            </a:r>
+            <a:r>
+              <a:rPr/>
+              <a:t> </a:t>
+            </a:r>
+            <a:r>
+              <a:rPr/>
+              <a:t>is</a:t>
+            </a:r>
+            <a:r>
+              <a:rPr/>
+              <a:t> </a:t>
+            </a:r>
+            <a:r>
+              <a:rPr/>
+              <a:t>easily</a:t>
+            </a:r>
+            <a:r>
+              <a:rPr/>
+              <a:t> </a:t>
+            </a:r>
+            <a:r>
+              <a:rPr/>
+              <a:t>perceived</a:t>
+            </a:r>
+            <a:r>
+              <a:rPr/>
+              <a:t> </a:t>
+            </a:r>
+            <a:r>
+              <a:rPr/>
+              <a:t>even</a:t>
+            </a:r>
+            <a:r>
+              <a:rPr/>
+              <a:t> </a:t>
+            </a:r>
+            <a:r>
+              <a:rPr/>
+              <a:t>by</a:t>
+            </a:r>
+            <a:r>
+              <a:rPr/>
+              <a:t> </a:t>
+            </a:r>
+            <a:r>
+              <a:rPr/>
+              <a:t>color</a:t>
+            </a:r>
+            <a:r>
+              <a:rPr/>
+              <a:t> </a:t>
+            </a:r>
+            <a:r>
+              <a:rPr/>
+              <a:t>blind</a:t>
+            </a:r>
+            <a:r>
+              <a:rPr/>
+              <a:t> </a:t>
+            </a:r>
+            <a:r>
+              <a:rPr/>
+              <a:t>viewers.</a:t>
+            </a:r>
+          </a:p>
+        </p:txBody>
+      </p:sp>
+      <p:sp>
+        <p:nvSpPr>
+          <p:cNvPr id="4" name="Slide Number Placeholder 3"/>
+          <p:cNvSpPr>
+            <a:spLocks noGrp="1"/>
+          </p:cNvSpPr>
+          <p:nvPr>
+            <p:ph type="sldNum" sz="quarter" idx="10"/>
+          </p:nvPr>
+        </p:nvSpPr>
+        <p:spPr/>
+        <p:txBody>
+          <a:bodyPr/>
+          <a:lstStyle/>
+          <a:p>
+            <a:fld id="{18BDFEC3-8487-43E8-A154-7C12CBC1FFF2}" type="slidenum">
+              <a:rPr lang="en-US"/>
+              <a:t>27</a:t>
             </a:fld>
             <a:endParaRPr lang="en-US"/>
           </a:p>
@@ -15885,73 +18341,72 @@
             </a:r>
             <a:r>
               <a:rPr/>
-              <a:t>same</a:t>
-            </a:r>
-            <a:r>
-              <a:rPr/>
-              <a:t> </a:t>
-            </a:r>
-            <a:r>
-              <a:rPr/>
-              <a:t>luminance,</a:t>
-            </a:r>
-            <a:r>
-              <a:rPr/>
-              <a:t> </a:t>
-            </a:r>
-            <a:r>
-              <a:rPr/>
-              <a:t>equally</a:t>
-            </a:r>
-            <a:r>
-              <a:rPr/>
-              <a:t> </a:t>
-            </a:r>
-            <a:r>
-              <a:rPr/>
-              <a:t>spaced</a:t>
-            </a:r>
-            <a:r>
-              <a:rPr/>
-              <a:t> </a:t>
-            </a:r>
-            <a:r>
-              <a:rPr/>
-              <a:t>hue</a:t>
+              <a:t>Disadvantages</a:t>
+            </a:r>
+            <a:r>
+              <a:rPr/>
+              <a:t> </a:t>
+            </a:r>
+            <a:r>
+              <a:rPr/>
+              <a:t>of</a:t>
+            </a:r>
+            <a:r>
+              <a:rPr/>
+              <a:t> </a:t>
+            </a:r>
+            <a:r>
+              <a:rPr/>
+              <a:t>equal</a:t>
+            </a:r>
+            <a:r>
+              <a:rPr/>
+              <a:t> </a:t>
+            </a:r>
+            <a:r>
+              <a:rPr/>
+              <a:t>luminance</a:t>
             </a:r>
           </a:p>
         </p:txBody>
       </p:sp>
-      <p:pic>
-        <p:nvPicPr>
-          <p:cNvPr descr="../images/r/hcl-circle.png" id="0" name="Picture 1"/>
-          <p:cNvPicPr>
-            <a:picLocks noGrp="1" noChangeAspect="1"/>
-          </p:cNvPicPr>
-          <p:nvPr/>
-        </p:nvPicPr>
-        <p:blipFill>
-          <a:blip r:embed="rId2"/>
-          <a:stretch>
-            <a:fillRect/>
-          </a:stretch>
-        </p:blipFill>
-        <p:spPr bwMode="auto">
-          <a:xfrm>
-            <a:off x="2311400" y="1600200"/>
-            <a:ext cx="4521200" cy="4521200"/>
-          </a:xfrm>
-          <a:prstGeom prst="rect">
-            <a:avLst/>
-          </a:prstGeom>
-          <a:noFill/>
-          <a:ln w="9525">
-            <a:noFill/>
-            <a:headEnd/>
-            <a:tailEnd/>
-          </a:ln>
-        </p:spPr>
-      </p:pic>
+      <p:sp>
+        <p:nvSpPr>
+          <p:cNvPr id="3" name="Content Placeholder 2"/>
+          <p:cNvSpPr>
+            <a:spLocks noGrp="1"/>
+          </p:cNvSpPr>
+          <p:nvPr>
+            <p:ph idx="1"/>
+          </p:nvPr>
+        </p:nvSpPr>
+        <p:spPr/>
+        <p:txBody>
+          <a:bodyPr/>
+          <a:lstStyle/>
+          <a:p>
+            <a:pPr lvl="1"/>
+            <a:r>
+              <a:rPr/>
+              <a:t>Limited contrast</a:t>
+            </a:r>
+          </a:p>
+          <a:p>
+            <a:pPr lvl="1"/>
+            <a:r>
+              <a:rPr/>
+              <a:t>Poor black and white reproduction</a:t>
+            </a:r>
+          </a:p>
+          <a:p>
+            <a:pPr lvl="1"/>
+            <a:r>
+              <a:rPr/>
+              <a:t>Possible problems for color blind viewers</a:t>
+            </a:r>
+          </a:p>
+        </p:txBody>
+      </p:sp>
     </p:spTree>
   </p:cSld>
 </p:sld>
@@ -16002,38 +18457,54 @@
             </a:r>
             <a:r>
               <a:rPr/>
-              <a:t>equally</a:t>
-            </a:r>
-            <a:r>
-              <a:rPr/>
-              <a:t> </a:t>
-            </a:r>
-            <a:r>
-              <a:rPr/>
-              <a:t>spaced</a:t>
-            </a:r>
-            <a:r>
-              <a:rPr/>
-              <a:t> </a:t>
-            </a:r>
-            <a:r>
-              <a:rPr/>
-              <a:t>hue,</a:t>
-            </a:r>
-            <a:r>
-              <a:rPr/>
-              <a:t> </a:t>
-            </a:r>
-            <a:r>
-              <a:rPr/>
-              <a:t>luminance</a:t>
+              <a:t>Give</a:t>
+            </a:r>
+            <a:r>
+              <a:rPr/>
+              <a:t> </a:t>
+            </a:r>
+            <a:r>
+              <a:rPr/>
+              <a:t>categories</a:t>
+            </a:r>
+            <a:r>
+              <a:rPr/>
+              <a:t> </a:t>
+            </a:r>
+            <a:r>
+              <a:rPr/>
+              <a:t>same</a:t>
+            </a:r>
+            <a:r>
+              <a:rPr/>
+              <a:t> </a:t>
+            </a:r>
+            <a:r>
+              <a:rPr/>
+              <a:t>luminance,</a:t>
+            </a:r>
+            <a:r>
+              <a:rPr/>
+              <a:t> </a:t>
+            </a:r>
+            <a:r>
+              <a:rPr/>
+              <a:t>equi-spaced</a:t>
+            </a:r>
+            <a:r>
+              <a:rPr/>
+              <a:t> </a:t>
+            </a:r>
+            <a:r>
+              <a:rPr/>
+              <a:t>hues</a:t>
             </a:r>
           </a:p>
         </p:txBody>
       </p:sp>
       <p:pic>
         <p:nvPicPr>
-          <p:cNvPr descr="../images/r/darker-hcl-circle.png" id="0" name="Picture 1"/>
+          <p:cNvPr descr="../images/r/hcl-circle.png" id="0" name="Picture 1"/>
           <p:cNvPicPr>
             <a:picLocks noGrp="1" noChangeAspect="1"/>
           </p:cNvPicPr>
@@ -16103,44 +18574,105 @@
             </a:pPr>
             <a:r>
               <a:rPr/>
-              <a:t>Avoid</a:t>
-            </a:r>
-            <a:r>
-              <a:rPr/>
-              <a:t> </a:t>
-            </a:r>
-            <a:r>
-              <a:rPr/>
-              <a:t>crosshatching</a:t>
+              <a:t>Recommendations,</a:t>
+            </a:r>
+            <a:r>
+              <a:rPr/>
+              <a:t> </a:t>
+            </a:r>
+            <a:r>
+              <a:rPr/>
+              <a:t>For</a:t>
+            </a:r>
+            <a:r>
+              <a:rPr/>
+              <a:t> </a:t>
+            </a:r>
+            <a:r>
+              <a:rPr/>
+              <a:t>many</a:t>
+            </a:r>
+            <a:r>
+              <a:rPr/>
+              <a:t> </a:t>
+            </a:r>
+            <a:r>
+              <a:rPr/>
+              <a:t>categories</a:t>
+            </a:r>
+            <a:r>
+              <a:rPr/>
+              <a:t> </a:t>
+            </a:r>
+            <a:r>
+              <a:rPr/>
+              <a:t>add</a:t>
+            </a:r>
+            <a:r>
+              <a:rPr/>
+              <a:t> </a:t>
+            </a:r>
+            <a:r>
+              <a:rPr/>
+              <a:t>second</a:t>
+            </a:r>
+            <a:r>
+              <a:rPr/>
+              <a:t> </a:t>
+            </a:r>
+            <a:r>
+              <a:rPr/>
+              <a:t>level</a:t>
+            </a:r>
+            <a:r>
+              <a:rPr/>
+              <a:t> </a:t>
+            </a:r>
+            <a:r>
+              <a:rPr/>
+              <a:t>of</a:t>
+            </a:r>
+            <a:r>
+              <a:rPr/>
+              <a:t> </a:t>
+            </a:r>
+            <a:r>
+              <a:rPr/>
+              <a:t>luminance</a:t>
             </a:r>
           </a:p>
         </p:txBody>
       </p:sp>
-      <p:sp>
-        <p:nvSpPr>
-          <p:cNvPr id="3" name="Content Placeholder 2"/>
-          <p:cNvSpPr>
-            <a:spLocks noGrp="1"/>
-          </p:cNvSpPr>
-          <p:nvPr>
-            <p:ph idx="1"/>
-          </p:nvPr>
-        </p:nvSpPr>
-        <p:spPr/>
-        <p:txBody>
-          <a:bodyPr/>
-          <a:lstStyle/>
-          <a:p>
-            <a:pPr lvl="0" marL="0" indent="0">
-              <a:buNone/>
-            </a:pPr>
-            <a:r>
-              <a:rPr/>
-              <a:t>(To be added)</a:t>
-            </a:r>
-          </a:p>
-        </p:txBody>
-      </p:sp>
+      <p:pic>
+        <p:nvPicPr>
+          <p:cNvPr descr="../images/r/darker-hcl-circle.png" id="0" name="Picture 1"/>
+          <p:cNvPicPr>
+            <a:picLocks noGrp="1" noChangeAspect="1"/>
+          </p:cNvPicPr>
+          <p:nvPr/>
+        </p:nvPicPr>
+        <p:blipFill>
+          <a:blip r:embed="rId2"/>
+          <a:stretch>
+            <a:fillRect/>
+          </a:stretch>
+        </p:blipFill>
+        <p:spPr bwMode="auto">
+          <a:xfrm>
+            <a:off x="2311400" y="1600200"/>
+            <a:ext cx="4521200" cy="4521200"/>
+          </a:xfrm>
+          <a:prstGeom prst="rect">
+            <a:avLst/>
+          </a:prstGeom>
+          <a:noFill/>
+          <a:ln w="9525">
+            <a:noFill/>
+            <a:headEnd/>
+            <a:tailEnd/>
+          </a:ln>
+        </p:spPr>
+      </p:pic>
     </p:spTree>
   </p:cSld>
 </p:sld>
@@ -16183,56 +18715,123 @@
             </a:pPr>
             <a:r>
               <a:rPr/>
-              <a:t>Varying</a:t>
-            </a:r>
-            <a:r>
-              <a:rPr/>
-              <a:t> </a:t>
-            </a:r>
-            <a:r>
-              <a:rPr/>
-              <a:t>hue</a:t>
-            </a:r>
-            <a:r>
-              <a:rPr/>
-              <a:t> </a:t>
-            </a:r>
-            <a:r>
-              <a:rPr/>
-              <a:t>and</a:t>
-            </a:r>
-            <a:r>
-              <a:rPr/>
-              <a:t> </a:t>
-            </a:r>
-            <a:r>
-              <a:rPr/>
-              <a:t>saturation</a:t>
+              <a:t>Recommendations,</a:t>
+            </a:r>
+            <a:r>
+              <a:rPr/>
+              <a:t> </a:t>
+            </a:r>
+            <a:r>
+              <a:rPr/>
+              <a:t>Avoid</a:t>
+            </a:r>
+            <a:r>
+              <a:rPr/>
+              <a:t> </a:t>
+            </a:r>
+            <a:r>
+              <a:rPr/>
+              <a:t>crosshatching</a:t>
             </a:r>
           </a:p>
         </p:txBody>
       </p:sp>
+      <p:pic>
+        <p:nvPicPr>
+          <p:cNvPr descr="../images/external/see-saw-illusion.gif" id="0" name="Picture 1"/>
+          <p:cNvPicPr>
+            <a:picLocks noGrp="1" noChangeAspect="1"/>
+          </p:cNvPicPr>
+          <p:nvPr/>
+        </p:nvPicPr>
+        <p:blipFill>
+          <a:blip r:embed="rId3"/>
+          <a:stretch>
+            <a:fillRect/>
+          </a:stretch>
+        </p:blipFill>
+        <p:spPr bwMode="auto">
+          <a:xfrm>
+            <a:off x="457200" y="1816100"/>
+            <a:ext cx="8229600" cy="3594100"/>
+          </a:xfrm>
+          <a:prstGeom prst="rect">
+            <a:avLst/>
+          </a:prstGeom>
+          <a:noFill/>
+          <a:ln w="9525">
+            <a:noFill/>
+            <a:headEnd/>
+            <a:tailEnd/>
+          </a:ln>
+        </p:spPr>
+      </p:pic>
       <p:sp>
         <p:nvSpPr>
-          <p:cNvPr id="3" name="Content Placeholder 2"/>
-          <p:cNvSpPr>
-            <a:spLocks noGrp="1"/>
-          </p:cNvSpPr>
-          <p:nvPr>
-            <p:ph idx="1"/>
-          </p:nvPr>
+          <p:cNvPr id="1" name="TextBox 3"/>
+          <p:cNvSpPr txBox="1"/>
+          <p:nvPr/>
         </p:nvSpPr>
-        <p:spPr/>
+        <p:spPr>
+          <a:xfrm>
+            <a:off x="457200" y="5613400"/>
+            <a:ext cx="8229600" cy="508000"/>
+          </a:xfrm>
+          <a:prstGeom prst="rect">
+            <a:avLst/>
+          </a:prstGeom>
+          <a:noFill/>
+        </p:spPr>
         <p:txBody>
           <a:bodyPr/>
           <a:lstStyle/>
           <a:p>
-            <a:pPr lvl="0" marL="0" indent="0">
+            <a:pPr lvl="0" marL="0" indent="0" algn="ctr">
               <a:buNone/>
             </a:pPr>
             <a:r>
               <a:rPr/>
-              <a:t>(To be added)</a:t>
+              <a:t>OPtical</a:t>
+            </a:r>
+            <a:r>
+              <a:rPr/>
+              <a:t> </a:t>
+            </a:r>
+            <a:r>
+              <a:rPr/>
+              <a:t>illusion</a:t>
+            </a:r>
+            <a:r>
+              <a:rPr/>
+              <a:t> </a:t>
+            </a:r>
+            <a:r>
+              <a:rPr/>
+              <a:t>caused</a:t>
+            </a:r>
+            <a:r>
+              <a:rPr/>
+              <a:t> </a:t>
+            </a:r>
+            <a:r>
+              <a:rPr/>
+              <a:t>by</a:t>
+            </a:r>
+            <a:r>
+              <a:rPr/>
+              <a:t> </a:t>
+            </a:r>
+            <a:r>
+              <a:rPr/>
+              <a:t>slanting</a:t>
+            </a:r>
+            <a:r>
+              <a:rPr/>
+              <a:t> </a:t>
+            </a:r>
+            <a:r>
+              <a:rPr/>
+              <a:t>lines</a:t>
             </a:r>
           </a:p>
         </p:txBody>
@@ -16259,9 +18858,74 @@
           <a:chExt cx="0" cy="0"/>
         </a:xfrm>
       </p:grpSpPr>
+      <p:sp>
+        <p:nvSpPr>
+          <p:cNvPr id="2" name="Title 1"/>
+          <p:cNvSpPr>
+            <a:spLocks noGrp="1"/>
+          </p:cNvSpPr>
+          <p:nvPr>
+            <p:ph type="title"/>
+          </p:nvPr>
+        </p:nvSpPr>
+        <p:spPr/>
+        <p:txBody>
+          <a:bodyPr/>
+          <a:lstStyle/>
+          <a:p>
+            <a:pPr lvl="0" marL="0" indent="0">
+              <a:buNone/>
+            </a:pPr>
+            <a:r>
+              <a:rPr/>
+              <a:t>Recommendations,</a:t>
+            </a:r>
+            <a:r>
+              <a:rPr/>
+              <a:t> </a:t>
+            </a:r>
+            <a:r>
+              <a:rPr/>
+              <a:t>Consider</a:t>
+            </a:r>
+            <a:r>
+              <a:rPr/>
+              <a:t> </a:t>
+            </a:r>
+            <a:r>
+              <a:rPr/>
+              <a:t>color-blindness</a:t>
+            </a:r>
+            <a:r>
+              <a:rPr/>
+              <a:t> </a:t>
+            </a:r>
+            <a:r>
+              <a:rPr/>
+              <a:t>in</a:t>
+            </a:r>
+            <a:r>
+              <a:rPr/>
+              <a:t> </a:t>
+            </a:r>
+            <a:r>
+              <a:rPr/>
+              <a:t>your</a:t>
+            </a:r>
+            <a:r>
+              <a:rPr/>
+              <a:t> </a:t>
+            </a:r>
+            <a:r>
+              <a:rPr/>
+              <a:t>visualizations.</a:t>
+            </a:r>
+          </a:p>
+        </p:txBody>
+      </p:sp>
       <p:pic>
         <p:nvPicPr>
-          <p:cNvPr descr="../images/r/virdis-colors.png" id="0" name="Picture 1"/>
+          <p:cNvPr descr="../images/external/color-blindness-test.png" id="0" name="Picture 1"/>
           <p:cNvPicPr>
             <a:picLocks noGrp="1" noChangeAspect="1"/>
           </p:cNvPicPr>
@@ -16275,8 +18939,8 @@
         </p:blipFill>
         <p:spPr bwMode="auto">
           <a:xfrm>
-            <a:off x="2311400" y="1600200"/>
-            <a:ext cx="4521200" cy="4521200"/>
+            <a:off x="2565400" y="1600200"/>
+            <a:ext cx="4013200" cy="4013200"/>
           </a:xfrm>
           <a:prstGeom prst="rect">
             <a:avLst/>
@@ -16289,6 +18953,68 @@
           </a:ln>
         </p:spPr>
       </p:pic>
+      <p:sp>
+        <p:nvSpPr>
+          <p:cNvPr id="1" name="TextBox 3"/>
+          <p:cNvSpPr txBox="1"/>
+          <p:nvPr/>
+        </p:nvSpPr>
+        <p:spPr>
+          <a:xfrm>
+            <a:off x="457200" y="5613400"/>
+            <a:ext cx="8229600" cy="508000"/>
+          </a:xfrm>
+          <a:prstGeom prst="rect">
+            <a:avLst/>
+          </a:prstGeom>
+          <a:noFill/>
+        </p:spPr>
+        <p:txBody>
+          <a:bodyPr/>
+          <a:lstStyle/>
+          <a:p>
+            <a:pPr lvl="0" marL="0" indent="0" algn="ctr">
+              <a:buNone/>
+            </a:pPr>
+            <a:r>
+              <a:rPr/>
+              <a:t>Image</a:t>
+            </a:r>
+            <a:r>
+              <a:rPr/>
+              <a:t> </a:t>
+            </a:r>
+            <a:r>
+              <a:rPr/>
+              <a:t>to</a:t>
+            </a:r>
+            <a:r>
+              <a:rPr/>
+              <a:t> </a:t>
+            </a:r>
+            <a:r>
+              <a:rPr/>
+              <a:t>test</a:t>
+            </a:r>
+            <a:r>
+              <a:rPr/>
+              <a:t> </a:t>
+            </a:r>
+            <a:r>
+              <a:rPr/>
+              <a:t>for</a:t>
+            </a:r>
+            <a:r>
+              <a:rPr/>
+              <a:t> </a:t>
+            </a:r>
+            <a:r>
+              <a:rPr/>
+              <a:t>color-blindness</a:t>
+            </a:r>
+          </a:p>
+        </p:txBody>
+      </p:sp>
     </p:spTree>
   </p:cSld>
 </p:sld>
@@ -16331,29 +19057,53 @@
             </a:pPr>
             <a:r>
               <a:rPr/>
-              <a:t>Gradients</a:t>
+              <a:t>Recommedations,</a:t>
+            </a:r>
+            <a:r>
+              <a:rPr/>
+              <a:t> </a:t>
+            </a:r>
+            <a:r>
+              <a:rPr/>
+              <a:t>Color</a:t>
+            </a:r>
+            <a:r>
+              <a:rPr/>
+              <a:t> </a:t>
+            </a:r>
+            <a:r>
+              <a:rPr/>
+              <a:t>blindness</a:t>
+            </a:r>
+            <a:r>
+              <a:rPr/>
+              <a:t> </a:t>
+            </a:r>
+            <a:r>
+              <a:rPr/>
+              <a:t>simulator</a:t>
             </a:r>
           </a:p>
         </p:txBody>
       </p:sp>
       <p:pic>
         <p:nvPicPr>
-          <p:cNvPr descr="../images/r/rainbow-gradient-1.png" id="0" name="Picture 1"/>
+          <p:cNvPr descr="../images/external/color-blindness-simulator.png" id="0" name="Picture 1"/>
           <p:cNvPicPr>
             <a:picLocks noGrp="1" noChangeAspect="1"/>
           </p:cNvPicPr>
           <p:nvPr/>
         </p:nvPicPr>
         <p:blipFill>
-          <a:blip r:embed="rId2"/>
+          <a:blip r:embed="rId3"/>
           <a:stretch>
             <a:fillRect/>
           </a:stretch>
         </p:blipFill>
         <p:spPr bwMode="auto">
           <a:xfrm>
-            <a:off x="2311400" y="1600200"/>
-            <a:ext cx="4521200" cy="4521200"/>
+            <a:off x="457200" y="1866900"/>
+            <a:ext cx="8229600" cy="3492500"/>
           </a:xfrm>
           <a:prstGeom prst="rect">
             <a:avLst/>
@@ -16366,6 +19116,287 @@
           </a:ln>
         </p:spPr>
       </p:pic>
+      <p:sp>
+        <p:nvSpPr>
+          <p:cNvPr id="1" name="TextBox 3"/>
+          <p:cNvSpPr txBox="1"/>
+          <p:nvPr/>
+        </p:nvSpPr>
+        <p:spPr>
+          <a:xfrm>
+            <a:off x="457200" y="5613400"/>
+            <a:ext cx="8229600" cy="508000"/>
+          </a:xfrm>
+          <a:prstGeom prst="rect">
+            <a:avLst/>
+          </a:prstGeom>
+          <a:noFill/>
+        </p:spPr>
+        <p:txBody>
+          <a:bodyPr/>
+          <a:lstStyle/>
+          <a:p>
+            <a:pPr lvl="0" marL="0" indent="0" algn="ctr">
+              <a:buNone/>
+            </a:pPr>
+            <a:r>
+              <a:rPr/>
+              <a:t>Screenshot</a:t>
+            </a:r>
+            <a:r>
+              <a:rPr/>
+              <a:t> </a:t>
+            </a:r>
+            <a:r>
+              <a:rPr/>
+              <a:t>of</a:t>
+            </a:r>
+            <a:r>
+              <a:rPr/>
+              <a:t> </a:t>
+            </a:r>
+            <a:r>
+              <a:rPr/>
+              <a:t>color</a:t>
+            </a:r>
+            <a:r>
+              <a:rPr/>
+              <a:t> </a:t>
+            </a:r>
+            <a:r>
+              <a:rPr/>
+              <a:t>blindness</a:t>
+            </a:r>
+            <a:r>
+              <a:rPr/>
+              <a:t> </a:t>
+            </a:r>
+            <a:r>
+              <a:rPr/>
+              <a:t>simulator</a:t>
+            </a:r>
+          </a:p>
+        </p:txBody>
+      </p:sp>
+    </p:spTree>
+  </p:cSld>
+</p:sld>
+</file>
+
+<file path=ppt/slides/slide27.xml><?xml version="1.0" encoding="utf-8"?>
+<p:sld xmlns:a="http://schemas.openxmlformats.org/drawingml/2006/main" xmlns:r="http://schemas.openxmlformats.org/officeDocument/2006/relationships" xmlns:p="http://schemas.openxmlformats.org/presentationml/2006/main">
+  <p:cSld>
+    <p:spTree>
+      <p:nvGrpSpPr>
+        <p:cNvPr id="1" name=""/>
+        <p:cNvGrpSpPr/>
+        <p:nvPr/>
+      </p:nvGrpSpPr>
+      <p:grpSpPr>
+        <a:xfrm>
+          <a:off x="0" y="0"/>
+          <a:ext cx="0" cy="0"/>
+          <a:chOff x="0" y="0"/>
+          <a:chExt cx="0" cy="0"/>
+        </a:xfrm>
+      </p:grpSpPr>
+      <p:sp>
+        <p:nvSpPr>
+          <p:cNvPr id="2" name="Title 1"/>
+          <p:cNvSpPr>
+            <a:spLocks noGrp="1"/>
+          </p:cNvSpPr>
+          <p:nvPr>
+            <p:ph type="title"/>
+          </p:nvPr>
+        </p:nvSpPr>
+        <p:spPr/>
+        <p:txBody>
+          <a:bodyPr/>
+          <a:lstStyle/>
+          <a:p>
+            <a:pPr lvl="0" marL="0" indent="0">
+              <a:buNone/>
+            </a:pPr>
+            <a:r>
+              <a:rPr/>
+              <a:t>Recommendations,</a:t>
+            </a:r>
+            <a:r>
+              <a:rPr/>
+              <a:t> </a:t>
+            </a:r>
+            <a:r>
+              <a:rPr/>
+              <a:t>Other</a:t>
+            </a:r>
+            <a:r>
+              <a:rPr/>
+              <a:t> </a:t>
+            </a:r>
+            <a:r>
+              <a:rPr/>
+              <a:t>steps</a:t>
+            </a:r>
+            <a:r>
+              <a:rPr/>
+              <a:t> </a:t>
+            </a:r>
+            <a:r>
+              <a:rPr/>
+              <a:t>to</a:t>
+            </a:r>
+            <a:r>
+              <a:rPr/>
+              <a:t> </a:t>
+            </a:r>
+            <a:r>
+              <a:rPr/>
+              <a:t>control</a:t>
+            </a:r>
+            <a:r>
+              <a:rPr/>
+              <a:t> </a:t>
+            </a:r>
+            <a:r>
+              <a:rPr/>
+              <a:t>for</a:t>
+            </a:r>
+            <a:r>
+              <a:rPr/>
+              <a:t> </a:t>
+            </a:r>
+            <a:r>
+              <a:rPr/>
+              <a:t>colorblindness</a:t>
+            </a:r>
+          </a:p>
+        </p:txBody>
+      </p:sp>
+      <p:sp>
+        <p:nvSpPr>
+          <p:cNvPr id="3" name="Content Placeholder 2"/>
+          <p:cNvSpPr>
+            <a:spLocks noGrp="1"/>
+          </p:cNvSpPr>
+          <p:nvPr>
+            <p:ph idx="1"/>
+          </p:nvPr>
+        </p:nvSpPr>
+        <p:spPr/>
+        <p:txBody>
+          <a:bodyPr/>
+          <a:lstStyle/>
+          <a:p>
+            <a:pPr lvl="1"/>
+            <a:r>
+              <a:rPr/>
+              <a:t>Categorical palettes are most troublesome</a:t>
+            </a:r>
+          </a:p>
+          <a:p>
+            <a:pPr lvl="1"/>
+            <a:r>
+              <a:rPr/>
+              <a:t>Use palettes described as color blind friendly</a:t>
+            </a:r>
+          </a:p>
+          <a:p>
+            <a:pPr lvl="1"/>
+            <a:r>
+              <a:rPr/>
+              <a:t>Use second visual cue (e.g., shape)</a:t>
+            </a:r>
+          </a:p>
+          <a:p>
+            <a:pPr lvl="1"/>
+            <a:r>
+              <a:rPr/>
+              <a:t>Deliberately vary luminance</a:t>
+            </a:r>
+          </a:p>
+        </p:txBody>
+      </p:sp>
+    </p:spTree>
+  </p:cSld>
+</p:sld>
+</file>
+
+<file path=ppt/slides/slide28.xml><?xml version="1.0" encoding="utf-8"?>
+<p:sld xmlns:a="http://schemas.openxmlformats.org/drawingml/2006/main" xmlns:r="http://schemas.openxmlformats.org/officeDocument/2006/relationships" xmlns:p="http://schemas.openxmlformats.org/presentationml/2006/main">
+  <p:cSld>
+    <p:spTree>
+      <p:nvGrpSpPr>
+        <p:cNvPr id="1" name=""/>
+        <p:cNvGrpSpPr/>
+        <p:nvPr/>
+      </p:nvGrpSpPr>
+      <p:grpSpPr>
+        <a:xfrm>
+          <a:off x="0" y="0"/>
+          <a:ext cx="0" cy="0"/>
+          <a:chOff x="0" y="0"/>
+          <a:chExt cx="0" cy="0"/>
+        </a:xfrm>
+      </p:grpSpPr>
+      <p:sp>
+        <p:nvSpPr>
+          <p:cNvPr id="2" name="Title 1"/>
+          <p:cNvSpPr>
+            <a:spLocks noGrp="1"/>
+          </p:cNvSpPr>
+          <p:nvPr>
+            <p:ph type="title"/>
+          </p:nvPr>
+        </p:nvSpPr>
+        <p:spPr/>
+        <p:txBody>
+          <a:bodyPr/>
+          <a:lstStyle/>
+          <a:p>
+            <a:pPr lvl="0" marL="0" indent="0">
+              <a:buNone/>
+            </a:pPr>
+            <a:r>
+              <a:rPr/>
+              <a:t>Recommendations,</a:t>
+            </a:r>
+            <a:r>
+              <a:rPr/>
+              <a:t> </a:t>
+            </a:r>
+            <a:r>
+              <a:rPr/>
+              <a:t>summary</a:t>
+            </a:r>
+          </a:p>
+        </p:txBody>
+      </p:sp>
+      <p:sp>
+        <p:nvSpPr>
+          <p:cNvPr id="3" name="Content Placeholder 2"/>
+          <p:cNvSpPr>
+            <a:spLocks noGrp="1"/>
+          </p:cNvSpPr>
+          <p:nvPr>
+            <p:ph idx="1"/>
+          </p:nvPr>
+        </p:nvSpPr>
+        <p:spPr/>
+        <p:txBody>
+          <a:bodyPr/>
+          <a:lstStyle/>
+          <a:p>
+            <a:pPr lvl="0" marL="0" indent="0">
+              <a:buNone/>
+            </a:pPr>
+            <a:r>
+              <a:rPr/>
+              <a:t>(To be added)</a:t>
+            </a:r>
+          </a:p>
+        </p:txBody>
+      </p:sp>
     </p:spTree>
   </p:cSld>
 </p:sld>

</xml_diff>